<commit_message>
# 서류 # 설계서 Class Design_9_pigeon.pptx # 4,5p # SC02,SC03 Class Design 작성
</commit_message>
<xml_diff>
--- a/doc/3_ 설계서/Class Design_9_pigeon.pptx
+++ b/doc/3_ 설계서/Class Design_9_pigeon.pptx
@@ -5,17 +5,18 @@
     <p:sldMasterId id="2147483655" r:id="rId1"/>
   </p:sldMasterIdLst>
   <p:notesMasterIdLst>
-    <p:notesMasterId r:id="rId7"/>
+    <p:notesMasterId r:id="rId8"/>
   </p:notesMasterIdLst>
   <p:handoutMasterIdLst>
-    <p:handoutMasterId r:id="rId8"/>
+    <p:handoutMasterId r:id="rId9"/>
   </p:handoutMasterIdLst>
   <p:sldIdLst>
     <p:sldId id="256" r:id="rId2"/>
     <p:sldId id="257" r:id="rId3"/>
-    <p:sldId id="258" r:id="rId4"/>
-    <p:sldId id="259" r:id="rId5"/>
-    <p:sldId id="260" r:id="rId6"/>
+    <p:sldId id="259" r:id="rId4"/>
+    <p:sldId id="261" r:id="rId5"/>
+    <p:sldId id="262" r:id="rId6"/>
+    <p:sldId id="260" r:id="rId7"/>
   </p:sldIdLst>
   <p:sldSz cx="9144000" cy="6858000" type="screen4x3"/>
   <p:notesSz cx="6797675" cy="9928225"/>
@@ -146,7 +147,7 @@
   </p:defaultTextStyle>
   <p:extLst>
     <p:ext uri="{EFAFB233-063F-42B5-8137-9DF3F51BA10A}">
-      <p15:sldGuideLst xmlns:p15="http://schemas.microsoft.com/office/powerpoint/2012/main">
+      <p15:sldGuideLst xmlns:p15="http://schemas.microsoft.com/office/powerpoint/2012/main" xmlns="">
         <p15:guide id="1" orient="horz">
           <p15:clr>
             <a:srgbClr val="A4A3A4"/>
@@ -165,7 +166,7 @@
       </p15:sldGuideLst>
     </p:ext>
     <p:ext uri="{2D200454-40CA-4A62-9FC3-DE9A4176ACB9}">
-      <p15:notesGuideLst xmlns:p15="http://schemas.microsoft.com/office/powerpoint/2012/main">
+      <p15:notesGuideLst xmlns:p15="http://schemas.microsoft.com/office/powerpoint/2012/main" xmlns="">
         <p15:guide id="1" orient="horz" pos="3126">
           <p15:clr>
             <a:srgbClr val="A4A3A4"/>
@@ -1834,21 +1835,7 @@
                           <a:latin typeface="맑은 고딕" pitchFamily="50" charset="-127"/>
                           <a:ea typeface="맑은 고딕" pitchFamily="50" charset="-127"/>
                         </a:rPr>
-                        <a:t>V </a:t>
-                      </a:r>
-                      <a:r>
-                        <a:rPr kumimoji="1" lang="en-US" altLang="ko-KR" sz="900" b="0" i="0" u="none" strike="noStrike" cap="none" normalizeH="0" baseline="0" dirty="0" smtClean="0">
-                          <a:ln>
-                            <a:noFill/>
-                          </a:ln>
-                          <a:solidFill>
-                            <a:schemeClr val="tx1"/>
-                          </a:solidFill>
-                          <a:effectLst/>
-                          <a:latin typeface="맑은 고딕" pitchFamily="50" charset="-127"/>
-                          <a:ea typeface="맑은 고딕" pitchFamily="50" charset="-127"/>
-                        </a:rPr>
-                        <a:t>1.0</a:t>
+                        <a:t>V 1.0</a:t>
                       </a:r>
                       <a:endParaRPr kumimoji="1" lang="ko-KR" altLang="ko-KR" sz="900" b="0" i="0" u="none" strike="noStrike" cap="none" normalizeH="0" baseline="0" dirty="0" smtClean="0">
                         <a:ln>
@@ -4016,111 +4003,870 @@
           <a:p>
             <a:pPr algn="r"/>
             <a:r>
-              <a:rPr lang="ko-KR" altLang="en-US" dirty="0" smtClean="0"/>
+              <a:rPr lang="ko-KR" altLang="en-US" smtClean="0"/>
               <a:t>팀 명</a:t>
             </a:r>
             <a:endParaRPr lang="en-US" altLang="ko-KR" dirty="0"/>
           </a:p>
         </p:txBody>
       </p:sp>
-      <p:sp>
-        <p:nvSpPr>
-          <p:cNvPr id="24" name="TextBox 23"/>
-          <p:cNvSpPr txBox="1"/>
+      <p:graphicFrame>
+        <p:nvGraphicFramePr>
+          <p:cNvPr id="3" name="표 2"/>
+          <p:cNvGraphicFramePr>
+            <a:graphicFrameLocks noGrp="1"/>
+          </p:cNvGraphicFramePr>
+          <p:nvPr>
+            <p:extLst>
+              <p:ext uri="{D42A27DB-BD31-4B8C-83A1-F6EECF244321}">
+                <p14:modId xmlns:p14="http://schemas.microsoft.com/office/powerpoint/2010/main" val="1459176571"/>
+              </p:ext>
+            </p:extLst>
+          </p:nvPr>
+        </p:nvGraphicFramePr>
+        <p:xfrm>
+          <a:off x="254759" y="2374900"/>
+          <a:ext cx="1799230" cy="1381760"/>
+        </p:xfrm>
+        <a:graphic>
+          <a:graphicData uri="http://schemas.openxmlformats.org/drawingml/2006/table">
+            <a:tbl>
+              <a:tblPr firstRow="1" bandRow="1">
+                <a:tableStyleId>{616DA210-FB5B-4158-B5E0-FEB733F419BA}</a:tableStyleId>
+              </a:tblPr>
+              <a:tblGrid>
+                <a:gridCol w="1799230"/>
+              </a:tblGrid>
+              <a:tr h="370840">
+                <a:tc>
+                  <a:txBody>
+                    <a:bodyPr/>
+                    <a:lstStyle/>
+                    <a:p>
+                      <a:pPr latinLnBrk="1"/>
+                      <a:r>
+                        <a:rPr lang="ko-KR" altLang="en-US" dirty="0" err="1" smtClean="0"/>
+                        <a:t>기본창</a:t>
+                      </a:r>
+                      <a:r>
+                        <a:rPr lang="en-US" altLang="ko-KR" dirty="0" smtClean="0"/>
+                        <a:t>(class 1)</a:t>
+                      </a:r>
+                      <a:endParaRPr lang="ko-KR" altLang="en-US" dirty="0"/>
+                    </a:p>
+                  </a:txBody>
+                  <a:tcPr/>
+                </a:tc>
+              </a:tr>
+              <a:tr h="370840">
+                <a:tc>
+                  <a:txBody>
+                    <a:bodyPr/>
+                    <a:lstStyle/>
+                    <a:p>
+                      <a:pPr latinLnBrk="1"/>
+                      <a:endParaRPr lang="ko-KR" altLang="en-US" dirty="0"/>
+                    </a:p>
+                  </a:txBody>
+                  <a:tcPr/>
+                </a:tc>
+              </a:tr>
+              <a:tr h="370840">
+                <a:tc>
+                  <a:txBody>
+                    <a:bodyPr/>
+                    <a:lstStyle/>
+                    <a:p>
+                      <a:pPr latinLnBrk="1"/>
+                      <a:r>
+                        <a:rPr lang="ko-KR" altLang="en-US" dirty="0" smtClean="0"/>
+                        <a:t>생성된다</a:t>
+                      </a:r>
+                      <a:r>
+                        <a:rPr lang="en-US" altLang="ko-KR" dirty="0" smtClean="0"/>
+                        <a:t>, </a:t>
+                      </a:r>
+                      <a:r>
+                        <a:rPr lang="ko-KR" altLang="en-US" dirty="0" smtClean="0"/>
+                        <a:t>사라진다</a:t>
+                      </a:r>
+                      <a:endParaRPr lang="ko-KR" altLang="en-US" dirty="0"/>
+                    </a:p>
+                  </a:txBody>
+                  <a:tcPr/>
+                </a:tc>
+              </a:tr>
+            </a:tbl>
+          </a:graphicData>
+        </a:graphic>
+      </p:graphicFrame>
+      <p:graphicFrame>
+        <p:nvGraphicFramePr>
+          <p:cNvPr id="4" name="표 3"/>
+          <p:cNvGraphicFramePr>
+            <a:graphicFrameLocks noGrp="1"/>
+          </p:cNvGraphicFramePr>
+          <p:nvPr>
+            <p:extLst>
+              <p:ext uri="{D42A27DB-BD31-4B8C-83A1-F6EECF244321}">
+                <p14:modId xmlns:p14="http://schemas.microsoft.com/office/powerpoint/2010/main" val="265182084"/>
+              </p:ext>
+            </p:extLst>
+          </p:nvPr>
+        </p:nvGraphicFramePr>
+        <p:xfrm>
+          <a:off x="3354159" y="987047"/>
+          <a:ext cx="2049441" cy="1112520"/>
+        </p:xfrm>
+        <a:graphic>
+          <a:graphicData uri="http://schemas.openxmlformats.org/drawingml/2006/table">
+            <a:tbl>
+              <a:tblPr firstRow="1" bandRow="1">
+                <a:tableStyleId>{69CF1AB2-1976-4502-BF36-3FF5EA218861}</a:tableStyleId>
+              </a:tblPr>
+              <a:tblGrid>
+                <a:gridCol w="2049441"/>
+              </a:tblGrid>
+              <a:tr h="370840">
+                <a:tc>
+                  <a:txBody>
+                    <a:bodyPr/>
+                    <a:lstStyle/>
+                    <a:p>
+                      <a:pPr latinLnBrk="1"/>
+                      <a:r>
+                        <a:rPr lang="ko-KR" altLang="en-US" sz="1200" dirty="0" smtClean="0"/>
+                        <a:t>버튼</a:t>
+                      </a:r>
+                      <a:endParaRPr lang="ko-KR" altLang="en-US" sz="1200" dirty="0"/>
+                    </a:p>
+                  </a:txBody>
+                  <a:tcPr/>
+                </a:tc>
+              </a:tr>
+              <a:tr h="370840">
+                <a:tc>
+                  <a:txBody>
+                    <a:bodyPr/>
+                    <a:lstStyle/>
+                    <a:p>
+                      <a:pPr latinLnBrk="1"/>
+                      <a:r>
+                        <a:rPr lang="ko-KR" altLang="en-US" sz="1200" dirty="0" smtClean="0"/>
+                        <a:t>오늘</a:t>
+                      </a:r>
+                      <a:endParaRPr lang="ko-KR" altLang="en-US" sz="1200" dirty="0"/>
+                    </a:p>
+                  </a:txBody>
+                  <a:tcPr/>
+                </a:tc>
+              </a:tr>
+              <a:tr h="370840">
+                <a:tc>
+                  <a:txBody>
+                    <a:bodyPr/>
+                    <a:lstStyle/>
+                    <a:p>
+                      <a:pPr latinLnBrk="1"/>
+                      <a:r>
+                        <a:rPr lang="ko-KR" altLang="en-US" sz="1200" dirty="0" smtClean="0"/>
+                        <a:t>클릭한다</a:t>
+                      </a:r>
+                      <a:r>
+                        <a:rPr lang="en-US" altLang="ko-KR" sz="1200" dirty="0" smtClean="0"/>
+                        <a:t>, </a:t>
+                      </a:r>
+                      <a:r>
+                        <a:rPr lang="ko-KR" altLang="en-US" sz="1200" dirty="0" smtClean="0"/>
+                        <a:t>인식한다</a:t>
+                      </a:r>
+                      <a:endParaRPr lang="ko-KR" altLang="en-US" sz="1200" dirty="0"/>
+                    </a:p>
+                  </a:txBody>
+                  <a:tcPr/>
+                </a:tc>
+              </a:tr>
+            </a:tbl>
+          </a:graphicData>
+        </a:graphic>
+      </p:graphicFrame>
+      <p:graphicFrame>
+        <p:nvGraphicFramePr>
+          <p:cNvPr id="5" name="표 4"/>
+          <p:cNvGraphicFramePr>
+            <a:graphicFrameLocks noGrp="1"/>
+          </p:cNvGraphicFramePr>
+          <p:nvPr>
+            <p:extLst>
+              <p:ext uri="{D42A27DB-BD31-4B8C-83A1-F6EECF244321}">
+                <p14:modId xmlns:p14="http://schemas.microsoft.com/office/powerpoint/2010/main" val="1443504248"/>
+              </p:ext>
+            </p:extLst>
+          </p:nvPr>
+        </p:nvGraphicFramePr>
+        <p:xfrm>
+          <a:off x="3378609" y="2272344"/>
+          <a:ext cx="2049441" cy="1112520"/>
+        </p:xfrm>
+        <a:graphic>
+          <a:graphicData uri="http://schemas.openxmlformats.org/drawingml/2006/table">
+            <a:tbl>
+              <a:tblPr firstRow="1" bandRow="1">
+                <a:tableStyleId>{69CF1AB2-1976-4502-BF36-3FF5EA218861}</a:tableStyleId>
+              </a:tblPr>
+              <a:tblGrid>
+                <a:gridCol w="2049441"/>
+              </a:tblGrid>
+              <a:tr h="370840">
+                <a:tc>
+                  <a:txBody>
+                    <a:bodyPr/>
+                    <a:lstStyle/>
+                    <a:p>
+                      <a:pPr latinLnBrk="1"/>
+                      <a:r>
+                        <a:rPr lang="ko-KR" altLang="en-US" sz="1200" baseline="0" dirty="0" smtClean="0"/>
+                        <a:t>버튼</a:t>
+                      </a:r>
+                      <a:endParaRPr lang="ko-KR" altLang="en-US" sz="1200" dirty="0"/>
+                    </a:p>
+                  </a:txBody>
+                  <a:tcPr/>
+                </a:tc>
+              </a:tr>
+              <a:tr h="370840">
+                <a:tc>
+                  <a:txBody>
+                    <a:bodyPr/>
+                    <a:lstStyle/>
+                    <a:p>
+                      <a:pPr latinLnBrk="1"/>
+                      <a:r>
+                        <a:rPr lang="ko-KR" altLang="en-US" sz="1200" dirty="0" smtClean="0"/>
+                        <a:t>달력</a:t>
+                      </a:r>
+                      <a:endParaRPr lang="ko-KR" altLang="en-US" sz="1200" dirty="0"/>
+                    </a:p>
+                  </a:txBody>
+                  <a:tcPr/>
+                </a:tc>
+              </a:tr>
+              <a:tr h="370840">
+                <a:tc>
+                  <a:txBody>
+                    <a:bodyPr/>
+                    <a:lstStyle/>
+                    <a:p>
+                      <a:pPr latinLnBrk="1"/>
+                      <a:r>
+                        <a:rPr lang="ko-KR" altLang="en-US" sz="1200" dirty="0" smtClean="0"/>
+                        <a:t>클릭한다</a:t>
+                      </a:r>
+                      <a:r>
+                        <a:rPr lang="en-US" altLang="ko-KR" sz="1200" dirty="0" smtClean="0"/>
+                        <a:t>, </a:t>
+                      </a:r>
+                      <a:r>
+                        <a:rPr lang="ko-KR" altLang="en-US" sz="1200" dirty="0" smtClean="0"/>
+                        <a:t>인식한다</a:t>
+                      </a:r>
+                      <a:endParaRPr lang="ko-KR" altLang="en-US" sz="1200" dirty="0"/>
+                    </a:p>
+                  </a:txBody>
+                  <a:tcPr/>
+                </a:tc>
+              </a:tr>
+            </a:tbl>
+          </a:graphicData>
+        </a:graphic>
+      </p:graphicFrame>
+      <p:graphicFrame>
+        <p:nvGraphicFramePr>
+          <p:cNvPr id="7" name="표 6"/>
+          <p:cNvGraphicFramePr>
+            <a:graphicFrameLocks noGrp="1"/>
+          </p:cNvGraphicFramePr>
+          <p:nvPr>
+            <p:extLst>
+              <p:ext uri="{D42A27DB-BD31-4B8C-83A1-F6EECF244321}">
+                <p14:modId xmlns:p14="http://schemas.microsoft.com/office/powerpoint/2010/main" val="3334336134"/>
+              </p:ext>
+            </p:extLst>
+          </p:nvPr>
+        </p:nvGraphicFramePr>
+        <p:xfrm>
+          <a:off x="3378609" y="3675568"/>
+          <a:ext cx="2058538" cy="1102360"/>
+        </p:xfrm>
+        <a:graphic>
+          <a:graphicData uri="http://schemas.openxmlformats.org/drawingml/2006/table">
+            <a:tbl>
+              <a:tblPr firstRow="1" bandRow="1">
+                <a:tableStyleId>{69CF1AB2-1976-4502-BF36-3FF5EA218861}</a:tableStyleId>
+              </a:tblPr>
+              <a:tblGrid>
+                <a:gridCol w="2058538"/>
+              </a:tblGrid>
+              <a:tr h="121010">
+                <a:tc>
+                  <a:txBody>
+                    <a:bodyPr/>
+                    <a:lstStyle/>
+                    <a:p>
+                      <a:pPr latinLnBrk="1"/>
+                      <a:r>
+                        <a:rPr lang="ko-KR" altLang="en-US" sz="1200" dirty="0" smtClean="0"/>
+                        <a:t>버튼</a:t>
+                      </a:r>
+                      <a:endParaRPr lang="ko-KR" altLang="en-US" sz="1200" dirty="0"/>
+                    </a:p>
+                  </a:txBody>
+                  <a:tcPr/>
+                </a:tc>
+              </a:tr>
+              <a:tr h="370840">
+                <a:tc>
+                  <a:txBody>
+                    <a:bodyPr/>
+                    <a:lstStyle/>
+                    <a:p>
+                      <a:pPr latinLnBrk="1"/>
+                      <a:r>
+                        <a:rPr lang="ko-KR" altLang="en-US" sz="1200" dirty="0" smtClean="0"/>
+                        <a:t>등록</a:t>
+                      </a:r>
+                      <a:endParaRPr lang="ko-KR" altLang="en-US" sz="1200" dirty="0"/>
+                    </a:p>
+                  </a:txBody>
+                  <a:tcPr/>
+                </a:tc>
+              </a:tr>
+              <a:tr h="370840">
+                <a:tc>
+                  <a:txBody>
+                    <a:bodyPr/>
+                    <a:lstStyle/>
+                    <a:p>
+                      <a:pPr latinLnBrk="1"/>
+                      <a:r>
+                        <a:rPr lang="ko-KR" altLang="en-US" sz="1200" dirty="0" smtClean="0"/>
+                        <a:t>클릭한다</a:t>
+                      </a:r>
+                      <a:r>
+                        <a:rPr lang="en-US" altLang="ko-KR" sz="1200" dirty="0" smtClean="0"/>
+                        <a:t>, </a:t>
+                      </a:r>
+                      <a:r>
+                        <a:rPr lang="ko-KR" altLang="en-US" sz="1200" dirty="0" smtClean="0"/>
+                        <a:t>인식한다</a:t>
+                      </a:r>
+                      <a:r>
+                        <a:rPr lang="en-US" altLang="ko-KR" sz="1200" dirty="0" smtClean="0"/>
+                        <a:t>, </a:t>
+                      </a:r>
+                      <a:r>
+                        <a:rPr lang="ko-KR" altLang="en-US" sz="1200" dirty="0" smtClean="0"/>
+                        <a:t>인터페이스가 변한다</a:t>
+                      </a:r>
+                      <a:r>
+                        <a:rPr lang="en-US" altLang="ko-KR" sz="1200" dirty="0" smtClean="0"/>
+                        <a:t>(class2)</a:t>
+                      </a:r>
+                      <a:endParaRPr lang="ko-KR" altLang="en-US" sz="1200" dirty="0"/>
+                    </a:p>
+                  </a:txBody>
+                  <a:tcPr/>
+                </a:tc>
+              </a:tr>
+            </a:tbl>
+          </a:graphicData>
+        </a:graphic>
+      </p:graphicFrame>
+      <p:graphicFrame>
+        <p:nvGraphicFramePr>
+          <p:cNvPr id="9" name="표 8"/>
+          <p:cNvGraphicFramePr>
+            <a:graphicFrameLocks noGrp="1"/>
+          </p:cNvGraphicFramePr>
+          <p:nvPr>
+            <p:extLst>
+              <p:ext uri="{D42A27DB-BD31-4B8C-83A1-F6EECF244321}">
+                <p14:modId xmlns:p14="http://schemas.microsoft.com/office/powerpoint/2010/main" val="263970391"/>
+              </p:ext>
+            </p:extLst>
+          </p:nvPr>
+        </p:nvGraphicFramePr>
+        <p:xfrm>
+          <a:off x="3378609" y="5011495"/>
+          <a:ext cx="2058538" cy="1102360"/>
+        </p:xfrm>
+        <a:graphic>
+          <a:graphicData uri="http://schemas.openxmlformats.org/drawingml/2006/table">
+            <a:tbl>
+              <a:tblPr firstRow="1" bandRow="1">
+                <a:tableStyleId>{69CF1AB2-1976-4502-BF36-3FF5EA218861}</a:tableStyleId>
+              </a:tblPr>
+              <a:tblGrid>
+                <a:gridCol w="2058538"/>
+              </a:tblGrid>
+              <a:tr h="121010">
+                <a:tc>
+                  <a:txBody>
+                    <a:bodyPr/>
+                    <a:lstStyle/>
+                    <a:p>
+                      <a:pPr latinLnBrk="1"/>
+                      <a:r>
+                        <a:rPr lang="ko-KR" altLang="en-US" sz="1200" dirty="0" smtClean="0"/>
+                        <a:t>버튼</a:t>
+                      </a:r>
+                      <a:endParaRPr lang="ko-KR" altLang="en-US" sz="1200" dirty="0"/>
+                    </a:p>
+                  </a:txBody>
+                  <a:tcPr/>
+                </a:tc>
+              </a:tr>
+              <a:tr h="370840">
+                <a:tc>
+                  <a:txBody>
+                    <a:bodyPr/>
+                    <a:lstStyle/>
+                    <a:p>
+                      <a:pPr latinLnBrk="1"/>
+                      <a:r>
+                        <a:rPr lang="ko-KR" altLang="en-US" sz="1200" dirty="0" smtClean="0"/>
+                        <a:t>과제</a:t>
+                      </a:r>
+                      <a:endParaRPr lang="ko-KR" altLang="en-US" sz="1200" dirty="0"/>
+                    </a:p>
+                  </a:txBody>
+                  <a:tcPr/>
+                </a:tc>
+              </a:tr>
+              <a:tr h="370840">
+                <a:tc>
+                  <a:txBody>
+                    <a:bodyPr/>
+                    <a:lstStyle/>
+                    <a:p>
+                      <a:pPr latinLnBrk="1"/>
+                      <a:r>
+                        <a:rPr lang="ko-KR" altLang="en-US" sz="1200" dirty="0" smtClean="0"/>
+                        <a:t>클릭한다</a:t>
+                      </a:r>
+                      <a:r>
+                        <a:rPr lang="en-US" altLang="ko-KR" sz="1200" dirty="0" smtClean="0"/>
+                        <a:t>, </a:t>
+                      </a:r>
+                      <a:r>
+                        <a:rPr lang="ko-KR" altLang="en-US" sz="1200" dirty="0" smtClean="0"/>
+                        <a:t>인식한다</a:t>
+                      </a:r>
+                      <a:r>
+                        <a:rPr lang="en-US" altLang="ko-KR" sz="1200" dirty="0" smtClean="0"/>
+                        <a:t>, </a:t>
+                      </a:r>
+                      <a:r>
+                        <a:rPr lang="ko-KR" altLang="en-US" sz="1200" dirty="0" smtClean="0"/>
+                        <a:t>인터페이스가 변한다</a:t>
+                      </a:r>
+                      <a:r>
+                        <a:rPr lang="en-US" altLang="ko-KR" sz="1200" dirty="0" smtClean="0"/>
+                        <a:t>(class3)</a:t>
+                      </a:r>
+                      <a:endParaRPr lang="ko-KR" altLang="en-US" sz="1200" dirty="0"/>
+                    </a:p>
+                  </a:txBody>
+                  <a:tcPr/>
+                </a:tc>
+              </a:tr>
+            </a:tbl>
+          </a:graphicData>
+        </a:graphic>
+      </p:graphicFrame>
+      <p:graphicFrame>
+        <p:nvGraphicFramePr>
+          <p:cNvPr id="10" name="표 9"/>
+          <p:cNvGraphicFramePr>
+            <a:graphicFrameLocks noGrp="1"/>
+          </p:cNvGraphicFramePr>
+          <p:nvPr>
+            <p:extLst>
+              <p:ext uri="{D42A27DB-BD31-4B8C-83A1-F6EECF244321}">
+                <p14:modId xmlns:p14="http://schemas.microsoft.com/office/powerpoint/2010/main" val="823577662"/>
+              </p:ext>
+            </p:extLst>
+          </p:nvPr>
+        </p:nvGraphicFramePr>
+        <p:xfrm>
+          <a:off x="6694451" y="1665514"/>
+          <a:ext cx="2166057" cy="1198880"/>
+        </p:xfrm>
+        <a:graphic>
+          <a:graphicData uri="http://schemas.openxmlformats.org/drawingml/2006/table">
+            <a:tbl>
+              <a:tblPr firstRow="1" bandRow="1">
+                <a:tableStyleId>{8A107856-5554-42FB-B03E-39F5DBC370BA}</a:tableStyleId>
+              </a:tblPr>
+              <a:tblGrid>
+                <a:gridCol w="2166057"/>
+              </a:tblGrid>
+              <a:tr h="370840">
+                <a:tc>
+                  <a:txBody>
+                    <a:bodyPr/>
+                    <a:lstStyle/>
+                    <a:p>
+                      <a:pPr latinLnBrk="1"/>
+                      <a:r>
+                        <a:rPr lang="ko-KR" altLang="en-US" sz="1200" dirty="0" smtClean="0"/>
+                        <a:t>텍스트 창</a:t>
+                      </a:r>
+                      <a:endParaRPr lang="ko-KR" altLang="en-US" sz="1200" dirty="0"/>
+                    </a:p>
+                  </a:txBody>
+                  <a:tcPr/>
+                </a:tc>
+              </a:tr>
+              <a:tr h="370840">
+                <a:tc>
+                  <a:txBody>
+                    <a:bodyPr/>
+                    <a:lstStyle/>
+                    <a:p>
+                      <a:pPr latinLnBrk="1"/>
+                      <a:r>
+                        <a:rPr lang="ko-KR" altLang="en-US" sz="1200" dirty="0" smtClean="0"/>
+                        <a:t>오늘 할 일들</a:t>
+                      </a:r>
+                      <a:endParaRPr lang="ko-KR" altLang="en-US" sz="1200" dirty="0"/>
+                    </a:p>
+                  </a:txBody>
+                  <a:tcPr/>
+                </a:tc>
+              </a:tr>
+              <a:tr h="370840">
+                <a:tc>
+                  <a:txBody>
+                    <a:bodyPr/>
+                    <a:lstStyle/>
+                    <a:p>
+                      <a:pPr latinLnBrk="1"/>
+                      <a:r>
+                        <a:rPr lang="ko-KR" altLang="en-US" sz="1200" dirty="0" smtClean="0"/>
+                        <a:t>출력된다</a:t>
+                      </a:r>
+                      <a:r>
+                        <a:rPr lang="en-US" altLang="ko-KR" sz="1200" dirty="0" smtClean="0"/>
+                        <a:t>, </a:t>
+                      </a:r>
+                      <a:r>
+                        <a:rPr lang="ko-KR" altLang="en-US" sz="1200" dirty="0" smtClean="0"/>
+                        <a:t>중요도에 따라 나열한다</a:t>
+                      </a:r>
+                      <a:endParaRPr lang="ko-KR" altLang="en-US" sz="1200" dirty="0"/>
+                    </a:p>
+                  </a:txBody>
+                  <a:tcPr/>
+                </a:tc>
+              </a:tr>
+            </a:tbl>
+          </a:graphicData>
+        </a:graphic>
+      </p:graphicFrame>
+      <p:graphicFrame>
+        <p:nvGraphicFramePr>
+          <p:cNvPr id="11" name="표 10"/>
+          <p:cNvGraphicFramePr>
+            <a:graphicFrameLocks noGrp="1"/>
+          </p:cNvGraphicFramePr>
+          <p:nvPr>
+            <p:extLst>
+              <p:ext uri="{D42A27DB-BD31-4B8C-83A1-F6EECF244321}">
+                <p14:modId xmlns:p14="http://schemas.microsoft.com/office/powerpoint/2010/main" val="781927584"/>
+              </p:ext>
+            </p:extLst>
+          </p:nvPr>
+        </p:nvGraphicFramePr>
+        <p:xfrm>
+          <a:off x="6694451" y="3035488"/>
+          <a:ext cx="2166057" cy="1112520"/>
+        </p:xfrm>
+        <a:graphic>
+          <a:graphicData uri="http://schemas.openxmlformats.org/drawingml/2006/table">
+            <a:tbl>
+              <a:tblPr firstRow="1" bandRow="1">
+                <a:tableStyleId>{8A107856-5554-42FB-B03E-39F5DBC370BA}</a:tableStyleId>
+              </a:tblPr>
+              <a:tblGrid>
+                <a:gridCol w="2166057"/>
+              </a:tblGrid>
+              <a:tr h="370840">
+                <a:tc>
+                  <a:txBody>
+                    <a:bodyPr/>
+                    <a:lstStyle/>
+                    <a:p>
+                      <a:pPr latinLnBrk="1"/>
+                      <a:r>
+                        <a:rPr lang="ko-KR" altLang="en-US" sz="1200" dirty="0" smtClean="0"/>
+                        <a:t>텍스트 창</a:t>
+                      </a:r>
+                      <a:endParaRPr lang="ko-KR" altLang="en-US" sz="1200" dirty="0"/>
+                    </a:p>
+                  </a:txBody>
+                  <a:tcPr/>
+                </a:tc>
+              </a:tr>
+              <a:tr h="370840">
+                <a:tc>
+                  <a:txBody>
+                    <a:bodyPr/>
+                    <a:lstStyle/>
+                    <a:p>
+                      <a:pPr latinLnBrk="1"/>
+                      <a:r>
+                        <a:rPr lang="ko-KR" altLang="en-US" sz="1200" dirty="0" smtClean="0"/>
+                        <a:t>달력</a:t>
+                      </a:r>
+                      <a:r>
+                        <a:rPr lang="en-US" altLang="ko-KR" sz="1200" dirty="0" smtClean="0"/>
+                        <a:t>,</a:t>
+                      </a:r>
+                      <a:r>
+                        <a:rPr lang="ko-KR" altLang="en-US" sz="1200" dirty="0" smtClean="0"/>
+                        <a:t> 할 일이 있는 날들</a:t>
+                      </a:r>
+                      <a:endParaRPr lang="ko-KR" altLang="en-US" sz="1200" dirty="0"/>
+                    </a:p>
+                  </a:txBody>
+                  <a:tcPr/>
+                </a:tc>
+              </a:tr>
+              <a:tr h="370840">
+                <a:tc>
+                  <a:txBody>
+                    <a:bodyPr/>
+                    <a:lstStyle/>
+                    <a:p>
+                      <a:pPr latinLnBrk="1"/>
+                      <a:r>
+                        <a:rPr lang="ko-KR" altLang="en-US" sz="1200" dirty="0" smtClean="0"/>
+                        <a:t>출력된다</a:t>
+                      </a:r>
+                      <a:r>
+                        <a:rPr lang="en-US" altLang="ko-KR" sz="1200" dirty="0" smtClean="0"/>
+                        <a:t>, </a:t>
+                      </a:r>
+                      <a:r>
+                        <a:rPr lang="ko-KR" altLang="en-US" sz="1200" dirty="0" smtClean="0"/>
+                        <a:t>표시된다</a:t>
+                      </a:r>
+                      <a:endParaRPr lang="ko-KR" altLang="en-US" sz="1200" dirty="0"/>
+                    </a:p>
+                  </a:txBody>
+                  <a:tcPr/>
+                </a:tc>
+              </a:tr>
+            </a:tbl>
+          </a:graphicData>
+        </a:graphic>
+      </p:graphicFrame>
+      <p:cxnSp>
+        <p:nvCxnSpPr>
+          <p:cNvPr id="13" name="직선 화살표 연결선 12"/>
+          <p:cNvCxnSpPr>
+            <a:endCxn id="4" idx="1"/>
+          </p:cNvCxnSpPr>
           <p:nvPr/>
-        </p:nvSpPr>
-        <p:spPr>
-          <a:xfrm>
-            <a:off x="914400" y="931659"/>
-            <a:ext cx="752129" cy="307777"/>
+        </p:nvCxnSpPr>
+        <p:spPr bwMode="auto">
+          <a:xfrm flipV="1">
+            <a:off x="2053989" y="1543307"/>
+            <a:ext cx="1300170" cy="1397787"/>
           </a:xfrm>
-          <a:prstGeom prst="rect">
+          <a:prstGeom prst="straightConnector1">
             <a:avLst/>
           </a:prstGeom>
-          <a:noFill/>
-        </p:spPr>
-        <p:txBody>
-          <a:bodyPr wrap="none" rtlCol="0">
-            <a:spAutoFit/>
-          </a:bodyPr>
-          <a:lstStyle/>
-          <a:p>
-            <a:r>
-              <a:rPr lang="en-US" altLang="ko-KR" dirty="0" smtClean="0"/>
-              <a:t>&lt;</a:t>
-            </a:r>
-            <a:r>
-              <a:rPr lang="ko-KR" altLang="en-US" dirty="0" smtClean="0"/>
-              <a:t>예시</a:t>
-            </a:r>
-            <a:r>
-              <a:rPr lang="en-US" altLang="ko-KR" dirty="0" smtClean="0"/>
-              <a:t>&gt;</a:t>
-            </a:r>
-            <a:endParaRPr lang="ko-KR" altLang="en-US" dirty="0"/>
-          </a:p>
-        </p:txBody>
-      </p:sp>
-      <p:pic>
-        <p:nvPicPr>
-          <p:cNvPr id="25" name="Picture 3"/>
-          <p:cNvPicPr>
-            <a:picLocks noChangeAspect="1" noChangeArrowheads="1"/>
-          </p:cNvPicPr>
-          <p:nvPr/>
-        </p:nvPicPr>
-        <p:blipFill>
-          <a:blip r:embed="rId2" cstate="print"/>
-          <a:srcRect/>
-          <a:stretch>
-            <a:fillRect/>
-          </a:stretch>
-        </p:blipFill>
-        <p:spPr bwMode="auto">
-          <a:xfrm>
-            <a:off x="1146106" y="1806652"/>
-            <a:ext cx="7058326" cy="1290231"/>
-          </a:xfrm>
-          <a:prstGeom prst="rect">
-            <a:avLst/>
-          </a:prstGeom>
-          <a:noFill/>
-          <a:ln w="9525">
-            <a:noFill/>
-            <a:miter lim="800000"/>
-            <a:headEnd/>
-            <a:tailEnd/>
+          <a:solidFill>
+            <a:schemeClr val="accent1"/>
+          </a:solidFill>
+          <a:ln w="12700" cap="flat" cmpd="sng" algn="ctr">
+            <a:solidFill>
+              <a:schemeClr val="tx1"/>
+            </a:solidFill>
+            <a:prstDash val="solid"/>
+            <a:round/>
+            <a:headEnd type="none" w="med" len="med"/>
+            <a:tailEnd type="triangle"/>
           </a:ln>
           <a:effectLst/>
         </p:spPr>
-      </p:pic>
-      <p:sp>
-        <p:nvSpPr>
-          <p:cNvPr id="3" name="TextBox 2"/>
-          <p:cNvSpPr txBox="1"/>
+      </p:cxnSp>
+      <p:cxnSp>
+        <p:nvCxnSpPr>
+          <p:cNvPr id="15" name="직선 화살표 연결선 14"/>
+          <p:cNvCxnSpPr>
+            <a:stCxn id="3" idx="3"/>
+            <a:endCxn id="5" idx="1"/>
+          </p:cNvCxnSpPr>
           <p:nvPr/>
-        </p:nvSpPr>
-        <p:spPr>
-          <a:xfrm>
-            <a:off x="1146106" y="340274"/>
-            <a:ext cx="184731" cy="307777"/>
+        </p:nvCxnSpPr>
+        <p:spPr bwMode="auto">
+          <a:xfrm flipV="1">
+            <a:off x="2053989" y="2828604"/>
+            <a:ext cx="1324620" cy="237176"/>
           </a:xfrm>
-          <a:prstGeom prst="rect">
+          <a:prstGeom prst="straightConnector1">
             <a:avLst/>
           </a:prstGeom>
-          <a:noFill/>
+          <a:solidFill>
+            <a:schemeClr val="accent1"/>
+          </a:solidFill>
+          <a:ln w="12700" cap="flat" cmpd="sng" algn="ctr">
+            <a:solidFill>
+              <a:schemeClr val="tx1"/>
+            </a:solidFill>
+            <a:prstDash val="solid"/>
+            <a:round/>
+            <a:headEnd type="none" w="med" len="med"/>
+            <a:tailEnd type="triangle"/>
+          </a:ln>
+          <a:effectLst/>
         </p:spPr>
-        <p:txBody>
-          <a:bodyPr wrap="none" rtlCol="0">
-            <a:spAutoFit/>
-          </a:bodyPr>
-          <a:lstStyle/>
-          <a:p>
-            <a:endParaRPr lang="ko-KR" altLang="en-US" dirty="0"/>
-          </a:p>
-        </p:txBody>
-      </p:sp>
+      </p:cxnSp>
+      <p:cxnSp>
+        <p:nvCxnSpPr>
+          <p:cNvPr id="17" name="직선 화살표 연결선 16"/>
+          <p:cNvCxnSpPr>
+            <a:endCxn id="9" idx="1"/>
+          </p:cNvCxnSpPr>
+          <p:nvPr/>
+        </p:nvCxnSpPr>
+        <p:spPr bwMode="auto">
+          <a:xfrm>
+            <a:off x="1202871" y="3756660"/>
+            <a:ext cx="2175738" cy="1806015"/>
+          </a:xfrm>
+          <a:prstGeom prst="straightConnector1">
+            <a:avLst/>
+          </a:prstGeom>
+          <a:solidFill>
+            <a:schemeClr val="accent1"/>
+          </a:solidFill>
+          <a:ln w="12700" cap="flat" cmpd="sng" algn="ctr">
+            <a:solidFill>
+              <a:schemeClr val="tx1"/>
+            </a:solidFill>
+            <a:prstDash val="solid"/>
+            <a:round/>
+            <a:headEnd type="none" w="med" len="med"/>
+            <a:tailEnd type="triangle"/>
+          </a:ln>
+          <a:effectLst/>
+        </p:spPr>
+      </p:cxnSp>
+      <p:cxnSp>
+        <p:nvCxnSpPr>
+          <p:cNvPr id="19" name="직선 화살표 연결선 18"/>
+          <p:cNvCxnSpPr>
+            <a:endCxn id="7" idx="1"/>
+          </p:cNvCxnSpPr>
+          <p:nvPr/>
+        </p:nvCxnSpPr>
+        <p:spPr bwMode="auto">
+          <a:xfrm>
+            <a:off x="1883229" y="3756660"/>
+            <a:ext cx="1495380" cy="470088"/>
+          </a:xfrm>
+          <a:prstGeom prst="straightConnector1">
+            <a:avLst/>
+          </a:prstGeom>
+          <a:solidFill>
+            <a:schemeClr val="accent1"/>
+          </a:solidFill>
+          <a:ln w="12700" cap="flat" cmpd="sng" algn="ctr">
+            <a:solidFill>
+              <a:schemeClr val="tx1"/>
+            </a:solidFill>
+            <a:prstDash val="solid"/>
+            <a:round/>
+            <a:headEnd type="none" w="med" len="med"/>
+            <a:tailEnd type="triangle"/>
+          </a:ln>
+          <a:effectLst/>
+        </p:spPr>
+      </p:cxnSp>
+      <p:cxnSp>
+        <p:nvCxnSpPr>
+          <p:cNvPr id="23" name="직선 화살표 연결선 22"/>
+          <p:cNvCxnSpPr>
+            <a:stCxn id="4" idx="3"/>
+            <a:endCxn id="10" idx="1"/>
+          </p:cNvCxnSpPr>
+          <p:nvPr/>
+        </p:nvCxnSpPr>
+        <p:spPr bwMode="auto">
+          <a:xfrm>
+            <a:off x="5403600" y="1543307"/>
+            <a:ext cx="1290851" cy="721647"/>
+          </a:xfrm>
+          <a:prstGeom prst="straightConnector1">
+            <a:avLst/>
+          </a:prstGeom>
+          <a:solidFill>
+            <a:schemeClr val="accent1"/>
+          </a:solidFill>
+          <a:ln w="12700" cap="flat" cmpd="sng" algn="ctr">
+            <a:solidFill>
+              <a:schemeClr val="tx1"/>
+            </a:solidFill>
+            <a:prstDash val="solid"/>
+            <a:round/>
+            <a:headEnd type="none" w="med" len="med"/>
+            <a:tailEnd type="triangle"/>
+          </a:ln>
+          <a:effectLst/>
+        </p:spPr>
+      </p:cxnSp>
+      <p:cxnSp>
+        <p:nvCxnSpPr>
+          <p:cNvPr id="25" name="직선 화살표 연결선 24"/>
+          <p:cNvCxnSpPr>
+            <a:stCxn id="5" idx="3"/>
+            <a:endCxn id="11" idx="1"/>
+          </p:cNvCxnSpPr>
+          <p:nvPr/>
+        </p:nvCxnSpPr>
+        <p:spPr bwMode="auto">
+          <a:xfrm>
+            <a:off x="5428050" y="2828604"/>
+            <a:ext cx="1266401" cy="763144"/>
+          </a:xfrm>
+          <a:prstGeom prst="straightConnector1">
+            <a:avLst/>
+          </a:prstGeom>
+          <a:solidFill>
+            <a:schemeClr val="accent1"/>
+          </a:solidFill>
+          <a:ln w="12700" cap="flat" cmpd="sng" algn="ctr">
+            <a:solidFill>
+              <a:schemeClr val="tx1"/>
+            </a:solidFill>
+            <a:prstDash val="solid"/>
+            <a:round/>
+            <a:headEnd type="none" w="med" len="med"/>
+            <a:tailEnd type="triangle"/>
+          </a:ln>
+          <a:effectLst/>
+        </p:spPr>
+      </p:cxnSp>
     </p:spTree>
+    <p:extLst>
+      <p:ext uri="{BB962C8B-B14F-4D97-AF65-F5344CB8AC3E}">
+        <p14:creationId xmlns:p14="http://schemas.microsoft.com/office/powerpoint/2010/main" val="121186760"/>
+      </p:ext>
+    </p:extLst>
   </p:cSld>
   <p:clrMapOvr>
     <a:masterClrMapping/>
@@ -4136,6 +4882,741 @@
 </file>
 
 <file path=ppt/slides/slide4.xml><?xml version="1.0" encoding="utf-8"?>
+<p:sld xmlns:a="http://schemas.openxmlformats.org/drawingml/2006/main" xmlns:r="http://schemas.openxmlformats.org/officeDocument/2006/relationships" xmlns:p="http://schemas.openxmlformats.org/presentationml/2006/main">
+  <p:cSld>
+    <p:spTree>
+      <p:nvGrpSpPr>
+        <p:cNvPr id="1" name=""/>
+        <p:cNvGrpSpPr/>
+        <p:nvPr/>
+      </p:nvGrpSpPr>
+      <p:grpSpPr>
+        <a:xfrm>
+          <a:off x="0" y="0"/>
+          <a:ext cx="0" cy="0"/>
+          <a:chOff x="0" y="0"/>
+          <a:chExt cx="0" cy="0"/>
+        </a:xfrm>
+      </p:grpSpPr>
+      <p:pic>
+        <p:nvPicPr>
+          <p:cNvPr id="1030" name="Picture 6"/>
+          <p:cNvPicPr>
+            <a:picLocks noChangeAspect="1" noChangeArrowheads="1"/>
+          </p:cNvPicPr>
+          <p:nvPr/>
+        </p:nvPicPr>
+        <p:blipFill>
+          <a:blip r:embed="rId2">
+            <a:extLst>
+              <a:ext uri="{28A0092B-C50C-407E-A947-70E740481C1C}">
+                <a14:useLocalDpi xmlns:a14="http://schemas.microsoft.com/office/drawing/2010/main" val="0"/>
+              </a:ext>
+            </a:extLst>
+          </a:blip>
+          <a:srcRect/>
+          <a:stretch>
+            <a:fillRect/>
+          </a:stretch>
+        </p:blipFill>
+        <p:spPr bwMode="auto">
+          <a:xfrm>
+            <a:off x="2162754" y="864752"/>
+            <a:ext cx="4977516" cy="5472437"/>
+          </a:xfrm>
+          <a:prstGeom prst="rect">
+            <a:avLst/>
+          </a:prstGeom>
+          <a:noFill/>
+          <a:ln>
+            <a:noFill/>
+          </a:ln>
+          <a:extLst>
+            <a:ext uri="{909E8E84-426E-40DD-AFC4-6F175D3DCCD1}">
+              <a14:hiddenFill xmlns:a14="http://schemas.microsoft.com/office/drawing/2010/main">
+                <a:solidFill>
+                  <a:schemeClr val="accent1"/>
+                </a:solidFill>
+              </a14:hiddenFill>
+            </a:ext>
+            <a:ext uri="{91240B29-F687-4F45-9708-019B960494DF}">
+              <a14:hiddenLine xmlns:a14="http://schemas.microsoft.com/office/drawing/2010/main" w="9525">
+                <a:solidFill>
+                  <a:schemeClr val="tx1"/>
+                </a:solidFill>
+                <a:miter lim="800000"/>
+                <a:headEnd/>
+                <a:tailEnd/>
+              </a14:hiddenLine>
+            </a:ext>
+          </a:extLst>
+        </p:spPr>
+      </p:pic>
+      <p:sp>
+        <p:nvSpPr>
+          <p:cNvPr id="2" name="바닥글 개체 틀 1"/>
+          <p:cNvSpPr>
+            <a:spLocks noGrp="1"/>
+          </p:cNvSpPr>
+          <p:nvPr>
+            <p:ph type="ftr" sz="quarter" idx="3"/>
+          </p:nvPr>
+        </p:nvSpPr>
+        <p:spPr/>
+        <p:txBody>
+          <a:bodyPr/>
+          <a:lstStyle/>
+          <a:p>
+            <a:pPr algn="r"/>
+            <a:r>
+              <a:rPr lang="ko-KR" altLang="en-US" smtClean="0"/>
+              <a:t>팀 명</a:t>
+            </a:r>
+            <a:endParaRPr lang="en-US" altLang="ko-KR" dirty="0"/>
+          </a:p>
+        </p:txBody>
+      </p:sp>
+      <p:cxnSp>
+        <p:nvCxnSpPr>
+          <p:cNvPr id="5" name="직선 화살표 연결선 4"/>
+          <p:cNvCxnSpPr/>
+          <p:nvPr/>
+        </p:nvCxnSpPr>
+        <p:spPr bwMode="auto">
+          <a:xfrm flipV="1">
+            <a:off x="3156668" y="1129085"/>
+            <a:ext cx="1025718" cy="2250219"/>
+          </a:xfrm>
+          <a:prstGeom prst="straightConnector1">
+            <a:avLst/>
+          </a:prstGeom>
+          <a:solidFill>
+            <a:schemeClr val="accent1"/>
+          </a:solidFill>
+          <a:ln w="3175" cap="flat" cmpd="sng" algn="ctr">
+            <a:solidFill>
+              <a:schemeClr val="tx1">
+                <a:alpha val="35000"/>
+              </a:schemeClr>
+            </a:solidFill>
+            <a:prstDash val="solid"/>
+            <a:round/>
+            <a:headEnd type="none" w="med" len="med"/>
+            <a:tailEnd type="arrow"/>
+          </a:ln>
+          <a:effectLst/>
+        </p:spPr>
+      </p:cxnSp>
+      <p:cxnSp>
+        <p:nvCxnSpPr>
+          <p:cNvPr id="32" name="직선 화살표 연결선 31"/>
+          <p:cNvCxnSpPr/>
+          <p:nvPr/>
+        </p:nvCxnSpPr>
+        <p:spPr bwMode="auto">
+          <a:xfrm flipV="1">
+            <a:off x="3156668" y="1733385"/>
+            <a:ext cx="1025718" cy="1645919"/>
+          </a:xfrm>
+          <a:prstGeom prst="straightConnector1">
+            <a:avLst/>
+          </a:prstGeom>
+          <a:solidFill>
+            <a:schemeClr val="accent1"/>
+          </a:solidFill>
+          <a:ln w="3175" cap="flat" cmpd="sng" algn="ctr">
+            <a:solidFill>
+              <a:schemeClr val="tx1">
+                <a:alpha val="35000"/>
+              </a:schemeClr>
+            </a:solidFill>
+            <a:prstDash val="solid"/>
+            <a:round/>
+            <a:headEnd type="none" w="med" len="med"/>
+            <a:tailEnd type="arrow"/>
+          </a:ln>
+          <a:effectLst/>
+        </p:spPr>
+      </p:cxnSp>
+      <p:cxnSp>
+        <p:nvCxnSpPr>
+          <p:cNvPr id="36" name="직선 화살표 연결선 35"/>
+          <p:cNvCxnSpPr/>
+          <p:nvPr/>
+        </p:nvCxnSpPr>
+        <p:spPr bwMode="auto">
+          <a:xfrm flipV="1">
+            <a:off x="3156668" y="2329732"/>
+            <a:ext cx="1025718" cy="1049572"/>
+          </a:xfrm>
+          <a:prstGeom prst="straightConnector1">
+            <a:avLst/>
+          </a:prstGeom>
+          <a:solidFill>
+            <a:schemeClr val="accent1"/>
+          </a:solidFill>
+          <a:ln w="3175" cap="flat" cmpd="sng" algn="ctr">
+            <a:solidFill>
+              <a:schemeClr val="tx1">
+                <a:alpha val="35000"/>
+              </a:schemeClr>
+            </a:solidFill>
+            <a:prstDash val="solid"/>
+            <a:round/>
+            <a:headEnd type="none" w="med" len="med"/>
+            <a:tailEnd type="arrow"/>
+          </a:ln>
+          <a:effectLst/>
+        </p:spPr>
+      </p:cxnSp>
+      <p:cxnSp>
+        <p:nvCxnSpPr>
+          <p:cNvPr id="39" name="직선 화살표 연결선 38"/>
+          <p:cNvCxnSpPr/>
+          <p:nvPr/>
+        </p:nvCxnSpPr>
+        <p:spPr bwMode="auto">
+          <a:xfrm flipV="1">
+            <a:off x="3156668" y="2918129"/>
+            <a:ext cx="1025718" cy="461175"/>
+          </a:xfrm>
+          <a:prstGeom prst="straightConnector1">
+            <a:avLst/>
+          </a:prstGeom>
+          <a:solidFill>
+            <a:schemeClr val="accent1"/>
+          </a:solidFill>
+          <a:ln w="3175" cap="flat" cmpd="sng" algn="ctr">
+            <a:solidFill>
+              <a:schemeClr val="tx1">
+                <a:alpha val="35000"/>
+              </a:schemeClr>
+            </a:solidFill>
+            <a:prstDash val="solid"/>
+            <a:round/>
+            <a:headEnd type="none" w="med" len="med"/>
+            <a:tailEnd type="arrow"/>
+          </a:ln>
+          <a:effectLst/>
+        </p:spPr>
+      </p:cxnSp>
+      <p:cxnSp>
+        <p:nvCxnSpPr>
+          <p:cNvPr id="42" name="직선 화살표 연결선 41"/>
+          <p:cNvCxnSpPr/>
+          <p:nvPr/>
+        </p:nvCxnSpPr>
+        <p:spPr bwMode="auto">
+          <a:xfrm>
+            <a:off x="3156668" y="3379304"/>
+            <a:ext cx="1025718" cy="135174"/>
+          </a:xfrm>
+          <a:prstGeom prst="straightConnector1">
+            <a:avLst/>
+          </a:prstGeom>
+          <a:solidFill>
+            <a:schemeClr val="accent1"/>
+          </a:solidFill>
+          <a:ln w="3175" cap="flat" cmpd="sng" algn="ctr">
+            <a:solidFill>
+              <a:schemeClr val="tx1">
+                <a:alpha val="35000"/>
+              </a:schemeClr>
+            </a:solidFill>
+            <a:prstDash val="solid"/>
+            <a:round/>
+            <a:headEnd type="none" w="med" len="med"/>
+            <a:tailEnd type="arrow"/>
+          </a:ln>
+          <a:effectLst/>
+        </p:spPr>
+      </p:cxnSp>
+      <p:cxnSp>
+        <p:nvCxnSpPr>
+          <p:cNvPr id="45" name="직선 화살표 연결선 44"/>
+          <p:cNvCxnSpPr/>
+          <p:nvPr/>
+        </p:nvCxnSpPr>
+        <p:spPr bwMode="auto">
+          <a:xfrm>
+            <a:off x="3156668" y="3379304"/>
+            <a:ext cx="1025718" cy="779228"/>
+          </a:xfrm>
+          <a:prstGeom prst="straightConnector1">
+            <a:avLst/>
+          </a:prstGeom>
+          <a:solidFill>
+            <a:schemeClr val="accent1"/>
+          </a:solidFill>
+          <a:ln w="3175" cap="flat" cmpd="sng" algn="ctr">
+            <a:solidFill>
+              <a:schemeClr val="tx1">
+                <a:alpha val="35000"/>
+              </a:schemeClr>
+            </a:solidFill>
+            <a:prstDash val="solid"/>
+            <a:round/>
+            <a:headEnd type="none" w="med" len="med"/>
+            <a:tailEnd type="arrow"/>
+          </a:ln>
+          <a:effectLst/>
+        </p:spPr>
+      </p:cxnSp>
+      <p:cxnSp>
+        <p:nvCxnSpPr>
+          <p:cNvPr id="48" name="직선 화살표 연결선 47"/>
+          <p:cNvCxnSpPr/>
+          <p:nvPr/>
+        </p:nvCxnSpPr>
+        <p:spPr bwMode="auto">
+          <a:xfrm>
+            <a:off x="3156668" y="3379304"/>
+            <a:ext cx="1025718" cy="1335819"/>
+          </a:xfrm>
+          <a:prstGeom prst="straightConnector1">
+            <a:avLst/>
+          </a:prstGeom>
+          <a:solidFill>
+            <a:schemeClr val="accent1"/>
+          </a:solidFill>
+          <a:ln w="3175" cap="flat" cmpd="sng" algn="ctr">
+            <a:solidFill>
+              <a:schemeClr val="tx1">
+                <a:alpha val="35000"/>
+              </a:schemeClr>
+            </a:solidFill>
+            <a:prstDash val="solid"/>
+            <a:round/>
+            <a:headEnd type="none" w="med" len="med"/>
+            <a:tailEnd type="arrow"/>
+          </a:ln>
+          <a:effectLst/>
+        </p:spPr>
+      </p:cxnSp>
+      <p:cxnSp>
+        <p:nvCxnSpPr>
+          <p:cNvPr id="52" name="직선 화살표 연결선 51"/>
+          <p:cNvCxnSpPr/>
+          <p:nvPr/>
+        </p:nvCxnSpPr>
+        <p:spPr bwMode="auto">
+          <a:xfrm>
+            <a:off x="3156668" y="3379304"/>
+            <a:ext cx="1025718" cy="1979875"/>
+          </a:xfrm>
+          <a:prstGeom prst="straightConnector1">
+            <a:avLst/>
+          </a:prstGeom>
+          <a:solidFill>
+            <a:schemeClr val="accent1"/>
+          </a:solidFill>
+          <a:ln w="3175" cap="flat" cmpd="sng" algn="ctr">
+            <a:solidFill>
+              <a:schemeClr val="tx1">
+                <a:alpha val="35000"/>
+              </a:schemeClr>
+            </a:solidFill>
+            <a:prstDash val="solid"/>
+            <a:round/>
+            <a:headEnd type="none" w="med" len="med"/>
+            <a:tailEnd type="arrow"/>
+          </a:ln>
+          <a:effectLst/>
+        </p:spPr>
+      </p:cxnSp>
+      <p:cxnSp>
+        <p:nvCxnSpPr>
+          <p:cNvPr id="55" name="직선 화살표 연결선 54"/>
+          <p:cNvCxnSpPr/>
+          <p:nvPr/>
+        </p:nvCxnSpPr>
+        <p:spPr bwMode="auto">
+          <a:xfrm>
+            <a:off x="3156668" y="3379304"/>
+            <a:ext cx="1025718" cy="2623931"/>
+          </a:xfrm>
+          <a:prstGeom prst="straightConnector1">
+            <a:avLst/>
+          </a:prstGeom>
+          <a:solidFill>
+            <a:schemeClr val="accent1"/>
+          </a:solidFill>
+          <a:ln w="3175" cap="flat" cmpd="sng" algn="ctr">
+            <a:solidFill>
+              <a:schemeClr val="tx1">
+                <a:alpha val="35000"/>
+              </a:schemeClr>
+            </a:solidFill>
+            <a:prstDash val="solid"/>
+            <a:round/>
+            <a:headEnd type="none" w="med" len="med"/>
+            <a:tailEnd type="arrow"/>
+          </a:ln>
+          <a:effectLst/>
+        </p:spPr>
+      </p:cxnSp>
+      <p:cxnSp>
+        <p:nvCxnSpPr>
+          <p:cNvPr id="59" name="직선 화살표 연결선 58"/>
+          <p:cNvCxnSpPr/>
+          <p:nvPr/>
+        </p:nvCxnSpPr>
+        <p:spPr bwMode="auto">
+          <a:xfrm>
+            <a:off x="4962939" y="2329732"/>
+            <a:ext cx="1042076" cy="214685"/>
+          </a:xfrm>
+          <a:prstGeom prst="straightConnector1">
+            <a:avLst/>
+          </a:prstGeom>
+          <a:solidFill>
+            <a:schemeClr val="accent1"/>
+          </a:solidFill>
+          <a:ln w="3175" cap="flat" cmpd="sng" algn="ctr">
+            <a:solidFill>
+              <a:schemeClr val="tx1">
+                <a:alpha val="35000"/>
+              </a:schemeClr>
+            </a:solidFill>
+            <a:prstDash val="solid"/>
+            <a:round/>
+            <a:headEnd type="none" w="med" len="med"/>
+            <a:tailEnd type="arrow"/>
+          </a:ln>
+          <a:effectLst/>
+        </p:spPr>
+      </p:cxnSp>
+      <p:cxnSp>
+        <p:nvCxnSpPr>
+          <p:cNvPr id="70" name="직선 화살표 연결선 69"/>
+          <p:cNvCxnSpPr/>
+          <p:nvPr/>
+        </p:nvCxnSpPr>
+        <p:spPr bwMode="auto">
+          <a:xfrm>
+            <a:off x="4962939" y="2329732"/>
+            <a:ext cx="1042076" cy="959378"/>
+          </a:xfrm>
+          <a:prstGeom prst="straightConnector1">
+            <a:avLst/>
+          </a:prstGeom>
+          <a:solidFill>
+            <a:schemeClr val="accent1"/>
+          </a:solidFill>
+          <a:ln w="3175" cap="flat" cmpd="sng" algn="ctr">
+            <a:solidFill>
+              <a:schemeClr val="tx1">
+                <a:alpha val="35000"/>
+              </a:schemeClr>
+            </a:solidFill>
+            <a:prstDash val="solid"/>
+            <a:round/>
+            <a:headEnd type="none" w="med" len="med"/>
+            <a:tailEnd type="arrow"/>
+          </a:ln>
+          <a:effectLst/>
+        </p:spPr>
+      </p:cxnSp>
+      <p:cxnSp>
+        <p:nvCxnSpPr>
+          <p:cNvPr id="72" name="직선 화살표 연결선 71"/>
+          <p:cNvCxnSpPr/>
+          <p:nvPr/>
+        </p:nvCxnSpPr>
+        <p:spPr bwMode="auto">
+          <a:xfrm>
+            <a:off x="4962939" y="2329732"/>
+            <a:ext cx="1042076" cy="1634943"/>
+          </a:xfrm>
+          <a:prstGeom prst="straightConnector1">
+            <a:avLst/>
+          </a:prstGeom>
+          <a:solidFill>
+            <a:schemeClr val="accent1"/>
+          </a:solidFill>
+          <a:ln w="3175" cap="flat" cmpd="sng" algn="ctr">
+            <a:solidFill>
+              <a:schemeClr val="tx1">
+                <a:alpha val="35000"/>
+              </a:schemeClr>
+            </a:solidFill>
+            <a:prstDash val="solid"/>
+            <a:round/>
+            <a:headEnd type="none" w="med" len="med"/>
+            <a:tailEnd type="arrow"/>
+          </a:ln>
+          <a:effectLst/>
+        </p:spPr>
+      </p:cxnSp>
+      <p:cxnSp>
+        <p:nvCxnSpPr>
+          <p:cNvPr id="75" name="직선 화살표 연결선 74"/>
+          <p:cNvCxnSpPr/>
+          <p:nvPr/>
+        </p:nvCxnSpPr>
+        <p:spPr bwMode="auto">
+          <a:xfrm>
+            <a:off x="4962939" y="2329732"/>
+            <a:ext cx="1042076" cy="2440161"/>
+          </a:xfrm>
+          <a:prstGeom prst="straightConnector1">
+            <a:avLst/>
+          </a:prstGeom>
+          <a:solidFill>
+            <a:schemeClr val="accent1"/>
+          </a:solidFill>
+          <a:ln w="3175" cap="flat" cmpd="sng" algn="ctr">
+            <a:solidFill>
+              <a:schemeClr val="tx1">
+                <a:alpha val="35000"/>
+              </a:schemeClr>
+            </a:solidFill>
+            <a:prstDash val="solid"/>
+            <a:round/>
+            <a:headEnd type="none" w="med" len="med"/>
+            <a:tailEnd type="arrow"/>
+          </a:ln>
+          <a:effectLst/>
+        </p:spPr>
+      </p:cxnSp>
+      <p:cxnSp>
+        <p:nvCxnSpPr>
+          <p:cNvPr id="78" name="직선 화살표 연결선 77"/>
+          <p:cNvCxnSpPr/>
+          <p:nvPr/>
+        </p:nvCxnSpPr>
+        <p:spPr bwMode="auto">
+          <a:xfrm>
+            <a:off x="4962939" y="2329732"/>
+            <a:ext cx="1042076" cy="3170316"/>
+          </a:xfrm>
+          <a:prstGeom prst="straightConnector1">
+            <a:avLst/>
+          </a:prstGeom>
+          <a:solidFill>
+            <a:schemeClr val="accent1"/>
+          </a:solidFill>
+          <a:ln w="3175" cap="flat" cmpd="sng" algn="ctr">
+            <a:solidFill>
+              <a:schemeClr val="tx1">
+                <a:alpha val="35000"/>
+              </a:schemeClr>
+            </a:solidFill>
+            <a:prstDash val="solid"/>
+            <a:round/>
+            <a:headEnd type="none" w="med" len="med"/>
+            <a:tailEnd type="arrow"/>
+          </a:ln>
+          <a:effectLst/>
+        </p:spPr>
+      </p:cxnSp>
+      <p:cxnSp>
+        <p:nvCxnSpPr>
+          <p:cNvPr id="81" name="직선 화살표 연결선 80"/>
+          <p:cNvCxnSpPr/>
+          <p:nvPr/>
+        </p:nvCxnSpPr>
+        <p:spPr bwMode="auto">
+          <a:xfrm flipV="1">
+            <a:off x="4976587" y="2544417"/>
+            <a:ext cx="1028428" cy="407831"/>
+          </a:xfrm>
+          <a:prstGeom prst="straightConnector1">
+            <a:avLst/>
+          </a:prstGeom>
+          <a:solidFill>
+            <a:schemeClr val="accent1"/>
+          </a:solidFill>
+          <a:ln w="3175" cap="flat" cmpd="sng" algn="ctr">
+            <a:solidFill>
+              <a:schemeClr val="tx1">
+                <a:alpha val="35000"/>
+              </a:schemeClr>
+            </a:solidFill>
+            <a:prstDash val="solid"/>
+            <a:round/>
+            <a:headEnd type="none" w="med" len="med"/>
+            <a:tailEnd type="arrow"/>
+          </a:ln>
+          <a:effectLst/>
+        </p:spPr>
+      </p:cxnSp>
+      <p:cxnSp>
+        <p:nvCxnSpPr>
+          <p:cNvPr id="85" name="직선 화살표 연결선 84"/>
+          <p:cNvCxnSpPr/>
+          <p:nvPr/>
+        </p:nvCxnSpPr>
+        <p:spPr bwMode="auto">
+          <a:xfrm>
+            <a:off x="4976587" y="2952248"/>
+            <a:ext cx="1028428" cy="336862"/>
+          </a:xfrm>
+          <a:prstGeom prst="straightConnector1">
+            <a:avLst/>
+          </a:prstGeom>
+          <a:solidFill>
+            <a:schemeClr val="accent1"/>
+          </a:solidFill>
+          <a:ln w="3175" cap="flat" cmpd="sng" algn="ctr">
+            <a:solidFill>
+              <a:schemeClr val="tx1">
+                <a:alpha val="35000"/>
+              </a:schemeClr>
+            </a:solidFill>
+            <a:prstDash val="solid"/>
+            <a:round/>
+            <a:headEnd type="none" w="med" len="med"/>
+            <a:tailEnd type="arrow"/>
+          </a:ln>
+          <a:effectLst/>
+        </p:spPr>
+      </p:cxnSp>
+      <p:cxnSp>
+        <p:nvCxnSpPr>
+          <p:cNvPr id="88" name="직선 화살표 연결선 87"/>
+          <p:cNvCxnSpPr/>
+          <p:nvPr/>
+        </p:nvCxnSpPr>
+        <p:spPr bwMode="auto">
+          <a:xfrm>
+            <a:off x="4976587" y="2952248"/>
+            <a:ext cx="1028428" cy="1012427"/>
+          </a:xfrm>
+          <a:prstGeom prst="straightConnector1">
+            <a:avLst/>
+          </a:prstGeom>
+          <a:solidFill>
+            <a:schemeClr val="accent1"/>
+          </a:solidFill>
+          <a:ln w="3175" cap="flat" cmpd="sng" algn="ctr">
+            <a:solidFill>
+              <a:schemeClr val="tx1">
+                <a:alpha val="35000"/>
+              </a:schemeClr>
+            </a:solidFill>
+            <a:prstDash val="solid"/>
+            <a:round/>
+            <a:headEnd type="none" w="med" len="med"/>
+            <a:tailEnd type="arrow"/>
+          </a:ln>
+          <a:effectLst/>
+        </p:spPr>
+      </p:cxnSp>
+      <p:cxnSp>
+        <p:nvCxnSpPr>
+          <p:cNvPr id="91" name="직선 화살표 연결선 90"/>
+          <p:cNvCxnSpPr/>
+          <p:nvPr/>
+        </p:nvCxnSpPr>
+        <p:spPr bwMode="auto">
+          <a:xfrm>
+            <a:off x="4962939" y="2952248"/>
+            <a:ext cx="1042076" cy="1817645"/>
+          </a:xfrm>
+          <a:prstGeom prst="straightConnector1">
+            <a:avLst/>
+          </a:prstGeom>
+          <a:solidFill>
+            <a:schemeClr val="accent1"/>
+          </a:solidFill>
+          <a:ln w="3175" cap="flat" cmpd="sng" algn="ctr">
+            <a:solidFill>
+              <a:schemeClr val="tx1">
+                <a:alpha val="35000"/>
+              </a:schemeClr>
+            </a:solidFill>
+            <a:prstDash val="solid"/>
+            <a:round/>
+            <a:headEnd type="none" w="med" len="med"/>
+            <a:tailEnd type="arrow"/>
+          </a:ln>
+          <a:effectLst/>
+        </p:spPr>
+      </p:cxnSp>
+      <p:cxnSp>
+        <p:nvCxnSpPr>
+          <p:cNvPr id="95" name="직선 화살표 연결선 94"/>
+          <p:cNvCxnSpPr/>
+          <p:nvPr/>
+        </p:nvCxnSpPr>
+        <p:spPr bwMode="auto">
+          <a:xfrm>
+            <a:off x="4976587" y="2952248"/>
+            <a:ext cx="1028428" cy="2547800"/>
+          </a:xfrm>
+          <a:prstGeom prst="straightConnector1">
+            <a:avLst/>
+          </a:prstGeom>
+          <a:solidFill>
+            <a:schemeClr val="accent1"/>
+          </a:solidFill>
+          <a:ln w="3175" cap="flat" cmpd="sng" algn="ctr">
+            <a:solidFill>
+              <a:schemeClr val="tx1">
+                <a:alpha val="35000"/>
+              </a:schemeClr>
+            </a:solidFill>
+            <a:prstDash val="solid"/>
+            <a:round/>
+            <a:headEnd type="none" w="med" len="med"/>
+            <a:tailEnd type="arrow"/>
+          </a:ln>
+          <a:effectLst/>
+        </p:spPr>
+      </p:cxnSp>
+      <p:cxnSp>
+        <p:nvCxnSpPr>
+          <p:cNvPr id="98" name="직선 화살표 연결선 97"/>
+          <p:cNvCxnSpPr/>
+          <p:nvPr/>
+        </p:nvCxnSpPr>
+        <p:spPr bwMode="auto">
+          <a:xfrm>
+            <a:off x="4962939" y="1733385"/>
+            <a:ext cx="1042076" cy="811032"/>
+          </a:xfrm>
+          <a:prstGeom prst="straightConnector1">
+            <a:avLst/>
+          </a:prstGeom>
+          <a:solidFill>
+            <a:schemeClr val="accent1"/>
+          </a:solidFill>
+          <a:ln w="3175" cap="flat" cmpd="sng" algn="ctr">
+            <a:solidFill>
+              <a:schemeClr val="tx1">
+                <a:alpha val="35000"/>
+              </a:schemeClr>
+            </a:solidFill>
+            <a:prstDash val="solid"/>
+            <a:round/>
+            <a:headEnd type="none" w="med" len="med"/>
+            <a:tailEnd type="arrow"/>
+          </a:ln>
+          <a:effectLst/>
+        </p:spPr>
+      </p:cxnSp>
+    </p:spTree>
+    <p:extLst>
+      <p:ext uri="{BB962C8B-B14F-4D97-AF65-F5344CB8AC3E}">
+        <p14:creationId xmlns:p14="http://schemas.microsoft.com/office/powerpoint/2010/main" val="3478314707"/>
+      </p:ext>
+    </p:extLst>
+  </p:cSld>
+  <p:clrMapOvr>
+    <a:masterClrMapping/>
+  </p:clrMapOvr>
+  <p:timing>
+    <p:tnLst>
+      <p:par>
+        <p:cTn id="1" dur="indefinite" restart="never" nodeType="tmRoot"/>
+      </p:par>
+    </p:tnLst>
+  </p:timing>
+</p:sld>
+</file>
+
+<file path=ppt/slides/slide5.xml><?xml version="1.0" encoding="utf-8"?>
 <p:sld xmlns:a="http://schemas.openxmlformats.org/drawingml/2006/main" xmlns:r="http://schemas.openxmlformats.org/officeDocument/2006/relationships" xmlns:p="http://schemas.openxmlformats.org/presentationml/2006/main">
   <p:cSld>
     <p:spTree>
@@ -4176,680 +5657,70 @@
           </a:p>
         </p:txBody>
       </p:sp>
-      <p:graphicFrame>
-        <p:nvGraphicFramePr>
-          <p:cNvPr id="3" name="표 2"/>
-          <p:cNvGraphicFramePr>
-            <a:graphicFrameLocks noGrp="1"/>
-          </p:cNvGraphicFramePr>
-          <p:nvPr>
-            <p:extLst>
-              <p:ext uri="{D42A27DB-BD31-4B8C-83A1-F6EECF244321}">
-                <p14:modId xmlns:p14="http://schemas.microsoft.com/office/powerpoint/2010/main" val="1459176571"/>
-              </p:ext>
-            </p:extLst>
-          </p:nvPr>
-        </p:nvGraphicFramePr>
-        <p:xfrm>
-          <a:off x="254759" y="2374900"/>
-          <a:ext cx="1799230" cy="1381760"/>
-        </p:xfrm>
-        <a:graphic>
-          <a:graphicData uri="http://schemas.openxmlformats.org/drawingml/2006/table">
-            <a:tbl>
-              <a:tblPr firstRow="1" bandRow="1">
-                <a:tableStyleId>{616DA210-FB5B-4158-B5E0-FEB733F419BA}</a:tableStyleId>
-              </a:tblPr>
-              <a:tblGrid>
-                <a:gridCol w="1799230"/>
-              </a:tblGrid>
-              <a:tr h="370840">
-                <a:tc>
-                  <a:txBody>
-                    <a:bodyPr/>
-                    <a:lstStyle/>
-                    <a:p>
-                      <a:pPr latinLnBrk="1"/>
-                      <a:r>
-                        <a:rPr lang="ko-KR" altLang="en-US" dirty="0" err="1" smtClean="0"/>
-                        <a:t>기본창</a:t>
-                      </a:r>
-                      <a:r>
-                        <a:rPr lang="en-US" altLang="ko-KR" dirty="0" smtClean="0"/>
-                        <a:t>(class 1)</a:t>
-                      </a:r>
-                      <a:endParaRPr lang="ko-KR" altLang="en-US" dirty="0"/>
-                    </a:p>
-                  </a:txBody>
-                  <a:tcPr/>
-                </a:tc>
-              </a:tr>
-              <a:tr h="370840">
-                <a:tc>
-                  <a:txBody>
-                    <a:bodyPr/>
-                    <a:lstStyle/>
-                    <a:p>
-                      <a:pPr latinLnBrk="1"/>
-                      <a:endParaRPr lang="ko-KR" altLang="en-US" dirty="0"/>
-                    </a:p>
-                  </a:txBody>
-                  <a:tcPr/>
-                </a:tc>
-              </a:tr>
-              <a:tr h="370840">
-                <a:tc>
-                  <a:txBody>
-                    <a:bodyPr/>
-                    <a:lstStyle/>
-                    <a:p>
-                      <a:pPr latinLnBrk="1"/>
-                      <a:r>
-                        <a:rPr lang="ko-KR" altLang="en-US" dirty="0" smtClean="0"/>
-                        <a:t>생성된다</a:t>
-                      </a:r>
-                      <a:r>
-                        <a:rPr lang="en-US" altLang="ko-KR" dirty="0" smtClean="0"/>
-                        <a:t>, </a:t>
-                      </a:r>
-                      <a:r>
-                        <a:rPr lang="ko-KR" altLang="en-US" dirty="0" smtClean="0"/>
-                        <a:t>사라진다</a:t>
-                      </a:r>
-                      <a:endParaRPr lang="ko-KR" altLang="en-US" dirty="0"/>
-                    </a:p>
-                  </a:txBody>
-                  <a:tcPr/>
-                </a:tc>
-              </a:tr>
-            </a:tbl>
-          </a:graphicData>
-        </a:graphic>
-      </p:graphicFrame>
-      <p:graphicFrame>
-        <p:nvGraphicFramePr>
-          <p:cNvPr id="4" name="표 3"/>
-          <p:cNvGraphicFramePr>
-            <a:graphicFrameLocks noGrp="1"/>
-          </p:cNvGraphicFramePr>
-          <p:nvPr>
-            <p:extLst>
-              <p:ext uri="{D42A27DB-BD31-4B8C-83A1-F6EECF244321}">
-                <p14:modId xmlns:p14="http://schemas.microsoft.com/office/powerpoint/2010/main" val="265182084"/>
-              </p:ext>
-            </p:extLst>
-          </p:nvPr>
-        </p:nvGraphicFramePr>
-        <p:xfrm>
-          <a:off x="3354159" y="987047"/>
-          <a:ext cx="2049441" cy="1112520"/>
-        </p:xfrm>
-        <a:graphic>
-          <a:graphicData uri="http://schemas.openxmlformats.org/drawingml/2006/table">
-            <a:tbl>
-              <a:tblPr firstRow="1" bandRow="1">
-                <a:tableStyleId>{69CF1AB2-1976-4502-BF36-3FF5EA218861}</a:tableStyleId>
-              </a:tblPr>
-              <a:tblGrid>
-                <a:gridCol w="2049441"/>
-              </a:tblGrid>
-              <a:tr h="370840">
-                <a:tc>
-                  <a:txBody>
-                    <a:bodyPr/>
-                    <a:lstStyle/>
-                    <a:p>
-                      <a:pPr latinLnBrk="1"/>
-                      <a:r>
-                        <a:rPr lang="ko-KR" altLang="en-US" sz="1200" dirty="0" smtClean="0"/>
-                        <a:t>버튼</a:t>
-                      </a:r>
-                      <a:endParaRPr lang="ko-KR" altLang="en-US" sz="1200" dirty="0"/>
-                    </a:p>
-                  </a:txBody>
-                  <a:tcPr/>
-                </a:tc>
-              </a:tr>
-              <a:tr h="370840">
-                <a:tc>
-                  <a:txBody>
-                    <a:bodyPr/>
-                    <a:lstStyle/>
-                    <a:p>
-                      <a:pPr latinLnBrk="1"/>
-                      <a:r>
-                        <a:rPr lang="ko-KR" altLang="en-US" sz="1200" dirty="0" smtClean="0"/>
-                        <a:t>오늘</a:t>
-                      </a:r>
-                      <a:endParaRPr lang="ko-KR" altLang="en-US" sz="1200" dirty="0"/>
-                    </a:p>
-                  </a:txBody>
-                  <a:tcPr/>
-                </a:tc>
-              </a:tr>
-              <a:tr h="370840">
-                <a:tc>
-                  <a:txBody>
-                    <a:bodyPr/>
-                    <a:lstStyle/>
-                    <a:p>
-                      <a:pPr latinLnBrk="1"/>
-                      <a:r>
-                        <a:rPr lang="ko-KR" altLang="en-US" sz="1200" dirty="0" smtClean="0"/>
-                        <a:t>클릭한다</a:t>
-                      </a:r>
-                      <a:r>
-                        <a:rPr lang="en-US" altLang="ko-KR" sz="1200" dirty="0" smtClean="0"/>
-                        <a:t>, </a:t>
-                      </a:r>
-                      <a:r>
-                        <a:rPr lang="ko-KR" altLang="en-US" sz="1200" dirty="0" smtClean="0"/>
-                        <a:t>인식한다</a:t>
-                      </a:r>
-                      <a:endParaRPr lang="ko-KR" altLang="en-US" sz="1200" dirty="0"/>
-                    </a:p>
-                  </a:txBody>
-                  <a:tcPr/>
-                </a:tc>
-              </a:tr>
-            </a:tbl>
-          </a:graphicData>
-        </a:graphic>
-      </p:graphicFrame>
-      <p:graphicFrame>
-        <p:nvGraphicFramePr>
-          <p:cNvPr id="5" name="표 4"/>
-          <p:cNvGraphicFramePr>
-            <a:graphicFrameLocks noGrp="1"/>
-          </p:cNvGraphicFramePr>
-          <p:nvPr>
-            <p:extLst>
-              <p:ext uri="{D42A27DB-BD31-4B8C-83A1-F6EECF244321}">
-                <p14:modId xmlns:p14="http://schemas.microsoft.com/office/powerpoint/2010/main" val="1443504248"/>
-              </p:ext>
-            </p:extLst>
-          </p:nvPr>
-        </p:nvGraphicFramePr>
-        <p:xfrm>
-          <a:off x="3378609" y="2272344"/>
-          <a:ext cx="2049441" cy="1112520"/>
-        </p:xfrm>
-        <a:graphic>
-          <a:graphicData uri="http://schemas.openxmlformats.org/drawingml/2006/table">
-            <a:tbl>
-              <a:tblPr firstRow="1" bandRow="1">
-                <a:tableStyleId>{69CF1AB2-1976-4502-BF36-3FF5EA218861}</a:tableStyleId>
-              </a:tblPr>
-              <a:tblGrid>
-                <a:gridCol w="2049441"/>
-              </a:tblGrid>
-              <a:tr h="370840">
-                <a:tc>
-                  <a:txBody>
-                    <a:bodyPr/>
-                    <a:lstStyle/>
-                    <a:p>
-                      <a:pPr latinLnBrk="1"/>
-                      <a:r>
-                        <a:rPr lang="ko-KR" altLang="en-US" sz="1200" baseline="0" dirty="0" smtClean="0"/>
-                        <a:t>버튼</a:t>
-                      </a:r>
-                      <a:endParaRPr lang="ko-KR" altLang="en-US" sz="1200" dirty="0"/>
-                    </a:p>
-                  </a:txBody>
-                  <a:tcPr/>
-                </a:tc>
-              </a:tr>
-              <a:tr h="370840">
-                <a:tc>
-                  <a:txBody>
-                    <a:bodyPr/>
-                    <a:lstStyle/>
-                    <a:p>
-                      <a:pPr latinLnBrk="1"/>
-                      <a:r>
-                        <a:rPr lang="ko-KR" altLang="en-US" sz="1200" dirty="0" smtClean="0"/>
-                        <a:t>달력</a:t>
-                      </a:r>
-                      <a:endParaRPr lang="ko-KR" altLang="en-US" sz="1200" dirty="0"/>
-                    </a:p>
-                  </a:txBody>
-                  <a:tcPr/>
-                </a:tc>
-              </a:tr>
-              <a:tr h="370840">
-                <a:tc>
-                  <a:txBody>
-                    <a:bodyPr/>
-                    <a:lstStyle/>
-                    <a:p>
-                      <a:pPr latinLnBrk="1"/>
-                      <a:r>
-                        <a:rPr lang="ko-KR" altLang="en-US" sz="1200" dirty="0" smtClean="0"/>
-                        <a:t>클릭한다</a:t>
-                      </a:r>
-                      <a:r>
-                        <a:rPr lang="en-US" altLang="ko-KR" sz="1200" dirty="0" smtClean="0"/>
-                        <a:t>, </a:t>
-                      </a:r>
-                      <a:r>
-                        <a:rPr lang="ko-KR" altLang="en-US" sz="1200" dirty="0" smtClean="0"/>
-                        <a:t>인식한다</a:t>
-                      </a:r>
-                      <a:endParaRPr lang="ko-KR" altLang="en-US" sz="1200" dirty="0"/>
-                    </a:p>
-                  </a:txBody>
-                  <a:tcPr/>
-                </a:tc>
-              </a:tr>
-            </a:tbl>
-          </a:graphicData>
-        </a:graphic>
-      </p:graphicFrame>
-      <p:graphicFrame>
-        <p:nvGraphicFramePr>
-          <p:cNvPr id="7" name="표 6"/>
-          <p:cNvGraphicFramePr>
-            <a:graphicFrameLocks noGrp="1"/>
-          </p:cNvGraphicFramePr>
-          <p:nvPr>
-            <p:extLst>
-              <p:ext uri="{D42A27DB-BD31-4B8C-83A1-F6EECF244321}">
-                <p14:modId xmlns:p14="http://schemas.microsoft.com/office/powerpoint/2010/main" val="3334336134"/>
-              </p:ext>
-            </p:extLst>
-          </p:nvPr>
-        </p:nvGraphicFramePr>
-        <p:xfrm>
-          <a:off x="3378609" y="3675568"/>
-          <a:ext cx="2058538" cy="1102360"/>
-        </p:xfrm>
-        <a:graphic>
-          <a:graphicData uri="http://schemas.openxmlformats.org/drawingml/2006/table">
-            <a:tbl>
-              <a:tblPr firstRow="1" bandRow="1">
-                <a:tableStyleId>{69CF1AB2-1976-4502-BF36-3FF5EA218861}</a:tableStyleId>
-              </a:tblPr>
-              <a:tblGrid>
-                <a:gridCol w="2058538"/>
-              </a:tblGrid>
-              <a:tr h="121010">
-                <a:tc>
-                  <a:txBody>
-                    <a:bodyPr/>
-                    <a:lstStyle/>
-                    <a:p>
-                      <a:pPr latinLnBrk="1"/>
-                      <a:r>
-                        <a:rPr lang="ko-KR" altLang="en-US" sz="1200" dirty="0" smtClean="0"/>
-                        <a:t>버튼</a:t>
-                      </a:r>
-                      <a:endParaRPr lang="ko-KR" altLang="en-US" sz="1200" dirty="0"/>
-                    </a:p>
-                  </a:txBody>
-                  <a:tcPr/>
-                </a:tc>
-              </a:tr>
-              <a:tr h="370840">
-                <a:tc>
-                  <a:txBody>
-                    <a:bodyPr/>
-                    <a:lstStyle/>
-                    <a:p>
-                      <a:pPr latinLnBrk="1"/>
-                      <a:r>
-                        <a:rPr lang="ko-KR" altLang="en-US" sz="1200" dirty="0" smtClean="0"/>
-                        <a:t>등록</a:t>
-                      </a:r>
-                      <a:endParaRPr lang="ko-KR" altLang="en-US" sz="1200" dirty="0"/>
-                    </a:p>
-                  </a:txBody>
-                  <a:tcPr/>
-                </a:tc>
-              </a:tr>
-              <a:tr h="370840">
-                <a:tc>
-                  <a:txBody>
-                    <a:bodyPr/>
-                    <a:lstStyle/>
-                    <a:p>
-                      <a:pPr latinLnBrk="1"/>
-                      <a:r>
-                        <a:rPr lang="ko-KR" altLang="en-US" sz="1200" dirty="0" smtClean="0"/>
-                        <a:t>클릭한다</a:t>
-                      </a:r>
-                      <a:r>
-                        <a:rPr lang="en-US" altLang="ko-KR" sz="1200" dirty="0" smtClean="0"/>
-                        <a:t>, </a:t>
-                      </a:r>
-                      <a:r>
-                        <a:rPr lang="ko-KR" altLang="en-US" sz="1200" dirty="0" smtClean="0"/>
-                        <a:t>인식한다</a:t>
-                      </a:r>
-                      <a:r>
-                        <a:rPr lang="en-US" altLang="ko-KR" sz="1200" dirty="0" smtClean="0"/>
-                        <a:t>, </a:t>
-                      </a:r>
-                      <a:r>
-                        <a:rPr lang="ko-KR" altLang="en-US" sz="1200" dirty="0" smtClean="0"/>
-                        <a:t>인터페이스가 변한다</a:t>
-                      </a:r>
-                      <a:r>
-                        <a:rPr lang="en-US" altLang="ko-KR" sz="1200" dirty="0" smtClean="0"/>
-                        <a:t>(class2)</a:t>
-                      </a:r>
-                      <a:endParaRPr lang="ko-KR" altLang="en-US" sz="1200" dirty="0"/>
-                    </a:p>
-                  </a:txBody>
-                  <a:tcPr/>
-                </a:tc>
-              </a:tr>
-            </a:tbl>
-          </a:graphicData>
-        </a:graphic>
-      </p:graphicFrame>
-      <p:graphicFrame>
-        <p:nvGraphicFramePr>
-          <p:cNvPr id="9" name="표 8"/>
-          <p:cNvGraphicFramePr>
-            <a:graphicFrameLocks noGrp="1"/>
-          </p:cNvGraphicFramePr>
-          <p:nvPr>
-            <p:extLst>
-              <p:ext uri="{D42A27DB-BD31-4B8C-83A1-F6EECF244321}">
-                <p14:modId xmlns:p14="http://schemas.microsoft.com/office/powerpoint/2010/main" val="263970391"/>
-              </p:ext>
-            </p:extLst>
-          </p:nvPr>
-        </p:nvGraphicFramePr>
-        <p:xfrm>
-          <a:off x="3378609" y="5011495"/>
-          <a:ext cx="2058538" cy="1102360"/>
-        </p:xfrm>
-        <a:graphic>
-          <a:graphicData uri="http://schemas.openxmlformats.org/drawingml/2006/table">
-            <a:tbl>
-              <a:tblPr firstRow="1" bandRow="1">
-                <a:tableStyleId>{69CF1AB2-1976-4502-BF36-3FF5EA218861}</a:tableStyleId>
-              </a:tblPr>
-              <a:tblGrid>
-                <a:gridCol w="2058538"/>
-              </a:tblGrid>
-              <a:tr h="121010">
-                <a:tc>
-                  <a:txBody>
-                    <a:bodyPr/>
-                    <a:lstStyle/>
-                    <a:p>
-                      <a:pPr latinLnBrk="1"/>
-                      <a:r>
-                        <a:rPr lang="ko-KR" altLang="en-US" sz="1200" dirty="0" smtClean="0"/>
-                        <a:t>버튼</a:t>
-                      </a:r>
-                      <a:endParaRPr lang="ko-KR" altLang="en-US" sz="1200" dirty="0"/>
-                    </a:p>
-                  </a:txBody>
-                  <a:tcPr/>
-                </a:tc>
-              </a:tr>
-              <a:tr h="370840">
-                <a:tc>
-                  <a:txBody>
-                    <a:bodyPr/>
-                    <a:lstStyle/>
-                    <a:p>
-                      <a:pPr latinLnBrk="1"/>
-                      <a:r>
-                        <a:rPr lang="ko-KR" altLang="en-US" sz="1200" dirty="0" smtClean="0"/>
-                        <a:t>과제</a:t>
-                      </a:r>
-                      <a:endParaRPr lang="ko-KR" altLang="en-US" sz="1200" dirty="0"/>
-                    </a:p>
-                  </a:txBody>
-                  <a:tcPr/>
-                </a:tc>
-              </a:tr>
-              <a:tr h="370840">
-                <a:tc>
-                  <a:txBody>
-                    <a:bodyPr/>
-                    <a:lstStyle/>
-                    <a:p>
-                      <a:pPr latinLnBrk="1"/>
-                      <a:r>
-                        <a:rPr lang="ko-KR" altLang="en-US" sz="1200" dirty="0" smtClean="0"/>
-                        <a:t>클릭한다</a:t>
-                      </a:r>
-                      <a:r>
-                        <a:rPr lang="en-US" altLang="ko-KR" sz="1200" dirty="0" smtClean="0"/>
-                        <a:t>, </a:t>
-                      </a:r>
-                      <a:r>
-                        <a:rPr lang="ko-KR" altLang="en-US" sz="1200" dirty="0" smtClean="0"/>
-                        <a:t>인식한다</a:t>
-                      </a:r>
-                      <a:r>
-                        <a:rPr lang="en-US" altLang="ko-KR" sz="1200" dirty="0" smtClean="0"/>
-                        <a:t>, </a:t>
-                      </a:r>
-                      <a:r>
-                        <a:rPr lang="ko-KR" altLang="en-US" sz="1200" dirty="0" smtClean="0"/>
-                        <a:t>인터페이스가 변한다</a:t>
-                      </a:r>
-                      <a:r>
-                        <a:rPr lang="en-US" altLang="ko-KR" sz="1200" dirty="0" smtClean="0"/>
-                        <a:t>(class3)</a:t>
-                      </a:r>
-                      <a:endParaRPr lang="ko-KR" altLang="en-US" sz="1200" dirty="0"/>
-                    </a:p>
-                  </a:txBody>
-                  <a:tcPr/>
-                </a:tc>
-              </a:tr>
-            </a:tbl>
-          </a:graphicData>
-        </a:graphic>
-      </p:graphicFrame>
-      <p:graphicFrame>
-        <p:nvGraphicFramePr>
-          <p:cNvPr id="10" name="표 9"/>
-          <p:cNvGraphicFramePr>
-            <a:graphicFrameLocks noGrp="1"/>
-          </p:cNvGraphicFramePr>
-          <p:nvPr>
-            <p:extLst>
-              <p:ext uri="{D42A27DB-BD31-4B8C-83A1-F6EECF244321}">
-                <p14:modId xmlns:p14="http://schemas.microsoft.com/office/powerpoint/2010/main" val="823577662"/>
-              </p:ext>
-            </p:extLst>
-          </p:nvPr>
-        </p:nvGraphicFramePr>
-        <p:xfrm>
-          <a:off x="6694451" y="1665514"/>
-          <a:ext cx="2166057" cy="1198880"/>
-        </p:xfrm>
-        <a:graphic>
-          <a:graphicData uri="http://schemas.openxmlformats.org/drawingml/2006/table">
-            <a:tbl>
-              <a:tblPr firstRow="1" bandRow="1">
-                <a:tableStyleId>{8A107856-5554-42FB-B03E-39F5DBC370BA}</a:tableStyleId>
-              </a:tblPr>
-              <a:tblGrid>
-                <a:gridCol w="2166057"/>
-              </a:tblGrid>
-              <a:tr h="370840">
-                <a:tc>
-                  <a:txBody>
-                    <a:bodyPr/>
-                    <a:lstStyle/>
-                    <a:p>
-                      <a:pPr latinLnBrk="1"/>
-                      <a:r>
-                        <a:rPr lang="ko-KR" altLang="en-US" sz="1200" dirty="0" smtClean="0"/>
-                        <a:t>텍스트 창</a:t>
-                      </a:r>
-                      <a:endParaRPr lang="ko-KR" altLang="en-US" sz="1200" dirty="0"/>
-                    </a:p>
-                  </a:txBody>
-                  <a:tcPr/>
-                </a:tc>
-              </a:tr>
-              <a:tr h="370840">
-                <a:tc>
-                  <a:txBody>
-                    <a:bodyPr/>
-                    <a:lstStyle/>
-                    <a:p>
-                      <a:pPr latinLnBrk="1"/>
-                      <a:r>
-                        <a:rPr lang="ko-KR" altLang="en-US" sz="1200" dirty="0" smtClean="0"/>
-                        <a:t>오늘 할 일들</a:t>
-                      </a:r>
-                      <a:endParaRPr lang="ko-KR" altLang="en-US" sz="1200" dirty="0"/>
-                    </a:p>
-                  </a:txBody>
-                  <a:tcPr/>
-                </a:tc>
-              </a:tr>
-              <a:tr h="370840">
-                <a:tc>
-                  <a:txBody>
-                    <a:bodyPr/>
-                    <a:lstStyle/>
-                    <a:p>
-                      <a:pPr latinLnBrk="1"/>
-                      <a:r>
-                        <a:rPr lang="ko-KR" altLang="en-US" sz="1200" dirty="0" smtClean="0"/>
-                        <a:t>출력된다</a:t>
-                      </a:r>
-                      <a:r>
-                        <a:rPr lang="en-US" altLang="ko-KR" sz="1200" dirty="0" smtClean="0"/>
-                        <a:t>, </a:t>
-                      </a:r>
-                      <a:r>
-                        <a:rPr lang="ko-KR" altLang="en-US" sz="1200" dirty="0" smtClean="0"/>
-                        <a:t>중요도에 따라 나열한다</a:t>
-                      </a:r>
-                      <a:endParaRPr lang="ko-KR" altLang="en-US" sz="1200" dirty="0"/>
-                    </a:p>
-                  </a:txBody>
-                  <a:tcPr/>
-                </a:tc>
-              </a:tr>
-            </a:tbl>
-          </a:graphicData>
-        </a:graphic>
-      </p:graphicFrame>
-      <p:graphicFrame>
-        <p:nvGraphicFramePr>
-          <p:cNvPr id="11" name="표 10"/>
-          <p:cNvGraphicFramePr>
-            <a:graphicFrameLocks noGrp="1"/>
-          </p:cNvGraphicFramePr>
-          <p:nvPr>
-            <p:extLst>
-              <p:ext uri="{D42A27DB-BD31-4B8C-83A1-F6EECF244321}">
-                <p14:modId xmlns:p14="http://schemas.microsoft.com/office/powerpoint/2010/main" val="781927584"/>
-              </p:ext>
-            </p:extLst>
-          </p:nvPr>
-        </p:nvGraphicFramePr>
-        <p:xfrm>
-          <a:off x="6694451" y="3035488"/>
-          <a:ext cx="2166057" cy="1112520"/>
-        </p:xfrm>
-        <a:graphic>
-          <a:graphicData uri="http://schemas.openxmlformats.org/drawingml/2006/table">
-            <a:tbl>
-              <a:tblPr firstRow="1" bandRow="1">
-                <a:tableStyleId>{8A107856-5554-42FB-B03E-39F5DBC370BA}</a:tableStyleId>
-              </a:tblPr>
-              <a:tblGrid>
-                <a:gridCol w="2166057"/>
-              </a:tblGrid>
-              <a:tr h="370840">
-                <a:tc>
-                  <a:txBody>
-                    <a:bodyPr/>
-                    <a:lstStyle/>
-                    <a:p>
-                      <a:pPr latinLnBrk="1"/>
-                      <a:r>
-                        <a:rPr lang="ko-KR" altLang="en-US" sz="1200" dirty="0" smtClean="0"/>
-                        <a:t>텍스트 창</a:t>
-                      </a:r>
-                      <a:endParaRPr lang="ko-KR" altLang="en-US" sz="1200" dirty="0"/>
-                    </a:p>
-                  </a:txBody>
-                  <a:tcPr/>
-                </a:tc>
-              </a:tr>
-              <a:tr h="370840">
-                <a:tc>
-                  <a:txBody>
-                    <a:bodyPr/>
-                    <a:lstStyle/>
-                    <a:p>
-                      <a:pPr latinLnBrk="1"/>
-                      <a:r>
-                        <a:rPr lang="ko-KR" altLang="en-US" sz="1200" dirty="0" smtClean="0"/>
-                        <a:t>달력</a:t>
-                      </a:r>
-                      <a:r>
-                        <a:rPr lang="en-US" altLang="ko-KR" sz="1200" dirty="0" smtClean="0"/>
-                        <a:t>,</a:t>
-                      </a:r>
-                      <a:r>
-                        <a:rPr lang="ko-KR" altLang="en-US" sz="1200" dirty="0" smtClean="0"/>
-                        <a:t> 할 일이 있는 날들</a:t>
-                      </a:r>
-                      <a:endParaRPr lang="ko-KR" altLang="en-US" sz="1200" dirty="0"/>
-                    </a:p>
-                  </a:txBody>
-                  <a:tcPr/>
-                </a:tc>
-              </a:tr>
-              <a:tr h="370840">
-                <a:tc>
-                  <a:txBody>
-                    <a:bodyPr/>
-                    <a:lstStyle/>
-                    <a:p>
-                      <a:pPr latinLnBrk="1"/>
-                      <a:r>
-                        <a:rPr lang="ko-KR" altLang="en-US" sz="1200" dirty="0" smtClean="0"/>
-                        <a:t>출력된다</a:t>
-                      </a:r>
-                      <a:r>
-                        <a:rPr lang="en-US" altLang="ko-KR" sz="1200" dirty="0" smtClean="0"/>
-                        <a:t>, </a:t>
-                      </a:r>
-                      <a:r>
-                        <a:rPr lang="ko-KR" altLang="en-US" sz="1200" dirty="0" smtClean="0"/>
-                        <a:t>표시된다</a:t>
-                      </a:r>
-                      <a:endParaRPr lang="ko-KR" altLang="en-US" sz="1200" dirty="0"/>
-                    </a:p>
-                  </a:txBody>
-                  <a:tcPr/>
-                </a:tc>
-              </a:tr>
-            </a:tbl>
-          </a:graphicData>
-        </a:graphic>
-      </p:graphicFrame>
+      <p:pic>
+        <p:nvPicPr>
+          <p:cNvPr id="2050" name="Picture 2"/>
+          <p:cNvPicPr>
+            <a:picLocks noChangeAspect="1" noChangeArrowheads="1"/>
+          </p:cNvPicPr>
+          <p:nvPr/>
+        </p:nvPicPr>
+        <p:blipFill>
+          <a:blip r:embed="rId2">
+            <a:extLst>
+              <a:ext uri="{28A0092B-C50C-407E-A947-70E740481C1C}">
+                <a14:useLocalDpi xmlns:a14="http://schemas.microsoft.com/office/drawing/2010/main" val="0"/>
+              </a:ext>
+            </a:extLst>
+          </a:blip>
+          <a:srcRect/>
+          <a:stretch>
+            <a:fillRect/>
+          </a:stretch>
+        </p:blipFill>
+        <p:spPr bwMode="auto">
+          <a:xfrm>
+            <a:off x="2210464" y="838862"/>
+            <a:ext cx="5136544" cy="5510253"/>
+          </a:xfrm>
+          <a:prstGeom prst="rect">
+            <a:avLst/>
+          </a:prstGeom>
+          <a:noFill/>
+          <a:ln>
+            <a:noFill/>
+          </a:ln>
+          <a:extLst>
+            <a:ext uri="{909E8E84-426E-40DD-AFC4-6F175D3DCCD1}">
+              <a14:hiddenFill xmlns:a14="http://schemas.microsoft.com/office/drawing/2010/main">
+                <a:solidFill>
+                  <a:schemeClr val="accent1"/>
+                </a:solidFill>
+              </a14:hiddenFill>
+            </a:ext>
+            <a:ext uri="{91240B29-F687-4F45-9708-019B960494DF}">
+              <a14:hiddenLine xmlns:a14="http://schemas.microsoft.com/office/drawing/2010/main" w="9525">
+                <a:solidFill>
+                  <a:schemeClr val="tx1"/>
+                </a:solidFill>
+                <a:miter lim="800000"/>
+                <a:headEnd/>
+                <a:tailEnd/>
+              </a14:hiddenLine>
+            </a:ext>
+          </a:extLst>
+        </p:spPr>
+      </p:pic>
       <p:cxnSp>
         <p:nvCxnSpPr>
-          <p:cNvPr id="13" name="직선 화살표 연결선 12"/>
-          <p:cNvCxnSpPr>
-            <a:endCxn id="4" idx="1"/>
-          </p:cNvCxnSpPr>
+          <p:cNvPr id="4" name="직선 화살표 연결선 3"/>
+          <p:cNvCxnSpPr/>
           <p:nvPr/>
         </p:nvCxnSpPr>
         <p:spPr bwMode="auto">
           <a:xfrm flipV="1">
-            <a:off x="2053989" y="1543307"/>
-            <a:ext cx="1300170" cy="1397787"/>
+            <a:off x="3212327" y="1129086"/>
+            <a:ext cx="970059" cy="2449001"/>
           </a:xfrm>
           <a:prstGeom prst="straightConnector1">
             <a:avLst/>
@@ -4857,14 +5728,78 @@
           <a:solidFill>
             <a:schemeClr val="accent1"/>
           </a:solidFill>
-          <a:ln w="12700" cap="flat" cmpd="sng" algn="ctr">
+          <a:ln w="3175" cap="flat" cmpd="sng" algn="ctr">
             <a:solidFill>
-              <a:schemeClr val="tx1"/>
+              <a:schemeClr val="tx1">
+                <a:alpha val="35000"/>
+              </a:schemeClr>
             </a:solidFill>
             <a:prstDash val="solid"/>
             <a:round/>
             <a:headEnd type="none" w="med" len="med"/>
-            <a:tailEnd type="triangle"/>
+            <a:tailEnd type="arrow"/>
+          </a:ln>
+          <a:effectLst/>
+        </p:spPr>
+      </p:cxnSp>
+      <p:cxnSp>
+        <p:nvCxnSpPr>
+          <p:cNvPr id="9" name="직선 화살표 연결선 8"/>
+          <p:cNvCxnSpPr/>
+          <p:nvPr/>
+        </p:nvCxnSpPr>
+        <p:spPr bwMode="auto">
+          <a:xfrm flipV="1">
+            <a:off x="3212327" y="1876508"/>
+            <a:ext cx="970059" cy="1701579"/>
+          </a:xfrm>
+          <a:prstGeom prst="straightConnector1">
+            <a:avLst/>
+          </a:prstGeom>
+          <a:solidFill>
+            <a:schemeClr val="accent1"/>
+          </a:solidFill>
+          <a:ln w="3175" cap="flat" cmpd="sng" algn="ctr">
+            <a:solidFill>
+              <a:schemeClr val="tx1">
+                <a:alpha val="35000"/>
+              </a:schemeClr>
+            </a:solidFill>
+            <a:prstDash val="solid"/>
+            <a:round/>
+            <a:headEnd type="none" w="med" len="med"/>
+            <a:tailEnd type="arrow"/>
+          </a:ln>
+          <a:effectLst/>
+        </p:spPr>
+      </p:cxnSp>
+      <p:cxnSp>
+        <p:nvCxnSpPr>
+          <p:cNvPr id="12" name="직선 화살표 연결선 11"/>
+          <p:cNvCxnSpPr/>
+          <p:nvPr/>
+        </p:nvCxnSpPr>
+        <p:spPr bwMode="auto">
+          <a:xfrm flipV="1">
+            <a:off x="3212327" y="2552370"/>
+            <a:ext cx="970059" cy="1025717"/>
+          </a:xfrm>
+          <a:prstGeom prst="straightConnector1">
+            <a:avLst/>
+          </a:prstGeom>
+          <a:solidFill>
+            <a:schemeClr val="accent1"/>
+          </a:solidFill>
+          <a:ln w="3175" cap="flat" cmpd="sng" algn="ctr">
+            <a:solidFill>
+              <a:schemeClr val="tx1">
+                <a:alpha val="35000"/>
+              </a:schemeClr>
+            </a:solidFill>
+            <a:prstDash val="solid"/>
+            <a:round/>
+            <a:headEnd type="none" w="med" len="med"/>
+            <a:tailEnd type="arrow"/>
           </a:ln>
           <a:effectLst/>
         </p:spPr>
@@ -4872,16 +5807,13 @@
       <p:cxnSp>
         <p:nvCxnSpPr>
           <p:cNvPr id="15" name="직선 화살표 연결선 14"/>
-          <p:cNvCxnSpPr>
-            <a:stCxn id="3" idx="3"/>
-            <a:endCxn id="5" idx="1"/>
-          </p:cNvCxnSpPr>
+          <p:cNvCxnSpPr/>
           <p:nvPr/>
         </p:nvCxnSpPr>
         <p:spPr bwMode="auto">
           <a:xfrm flipV="1">
-            <a:off x="2053989" y="2828604"/>
-            <a:ext cx="1324620" cy="237176"/>
+            <a:off x="3212327" y="3156668"/>
+            <a:ext cx="970059" cy="421419"/>
           </a:xfrm>
           <a:prstGeom prst="straightConnector1">
             <a:avLst/>
@@ -4889,30 +5821,30 @@
           <a:solidFill>
             <a:schemeClr val="accent1"/>
           </a:solidFill>
-          <a:ln w="12700" cap="flat" cmpd="sng" algn="ctr">
+          <a:ln w="3175" cap="flat" cmpd="sng" algn="ctr">
             <a:solidFill>
-              <a:schemeClr val="tx1"/>
+              <a:schemeClr val="tx1">
+                <a:alpha val="35000"/>
+              </a:schemeClr>
             </a:solidFill>
             <a:prstDash val="solid"/>
             <a:round/>
             <a:headEnd type="none" w="med" len="med"/>
-            <a:tailEnd type="triangle"/>
+            <a:tailEnd type="arrow"/>
           </a:ln>
           <a:effectLst/>
         </p:spPr>
       </p:cxnSp>
       <p:cxnSp>
         <p:nvCxnSpPr>
-          <p:cNvPr id="17" name="직선 화살표 연결선 16"/>
-          <p:cNvCxnSpPr>
-            <a:endCxn id="9" idx="1"/>
-          </p:cNvCxnSpPr>
+          <p:cNvPr id="18" name="직선 화살표 연결선 17"/>
+          <p:cNvCxnSpPr/>
           <p:nvPr/>
         </p:nvCxnSpPr>
         <p:spPr bwMode="auto">
           <a:xfrm>
-            <a:off x="1202871" y="3756660"/>
-            <a:ext cx="2175738" cy="1806015"/>
+            <a:off x="3212327" y="3578087"/>
+            <a:ext cx="970059" cy="262393"/>
           </a:xfrm>
           <a:prstGeom prst="straightConnector1">
             <a:avLst/>
@@ -4920,30 +5852,30 @@
           <a:solidFill>
             <a:schemeClr val="accent1"/>
           </a:solidFill>
-          <a:ln w="12700" cap="flat" cmpd="sng" algn="ctr">
+          <a:ln w="3175" cap="flat" cmpd="sng" algn="ctr">
             <a:solidFill>
-              <a:schemeClr val="tx1"/>
+              <a:schemeClr val="tx1">
+                <a:alpha val="35000"/>
+              </a:schemeClr>
             </a:solidFill>
             <a:prstDash val="solid"/>
             <a:round/>
             <a:headEnd type="none" w="med" len="med"/>
-            <a:tailEnd type="triangle"/>
+            <a:tailEnd type="arrow"/>
           </a:ln>
           <a:effectLst/>
         </p:spPr>
       </p:cxnSp>
       <p:cxnSp>
         <p:nvCxnSpPr>
-          <p:cNvPr id="19" name="직선 화살표 연결선 18"/>
-          <p:cNvCxnSpPr>
-            <a:endCxn id="7" idx="1"/>
-          </p:cNvCxnSpPr>
+          <p:cNvPr id="21" name="직선 화살표 연결선 20"/>
+          <p:cNvCxnSpPr/>
           <p:nvPr/>
         </p:nvCxnSpPr>
         <p:spPr bwMode="auto">
           <a:xfrm>
-            <a:off x="1883229" y="3756660"/>
-            <a:ext cx="1495380" cy="470088"/>
+            <a:off x="3212327" y="3578087"/>
+            <a:ext cx="970059" cy="962108"/>
           </a:xfrm>
           <a:prstGeom prst="straightConnector1">
             <a:avLst/>
@@ -4951,31 +5883,30 @@
           <a:solidFill>
             <a:schemeClr val="accent1"/>
           </a:solidFill>
-          <a:ln w="12700" cap="flat" cmpd="sng" algn="ctr">
+          <a:ln w="3175" cap="flat" cmpd="sng" algn="ctr">
             <a:solidFill>
-              <a:schemeClr val="tx1"/>
+              <a:schemeClr val="tx1">
+                <a:alpha val="35000"/>
+              </a:schemeClr>
             </a:solidFill>
             <a:prstDash val="solid"/>
             <a:round/>
             <a:headEnd type="none" w="med" len="med"/>
-            <a:tailEnd type="triangle"/>
+            <a:tailEnd type="arrow"/>
           </a:ln>
           <a:effectLst/>
         </p:spPr>
       </p:cxnSp>
       <p:cxnSp>
         <p:nvCxnSpPr>
-          <p:cNvPr id="23" name="직선 화살표 연결선 22"/>
-          <p:cNvCxnSpPr>
-            <a:stCxn id="4" idx="3"/>
-            <a:endCxn id="10" idx="1"/>
-          </p:cNvCxnSpPr>
+          <p:cNvPr id="24" name="직선 화살표 연결선 23"/>
+          <p:cNvCxnSpPr/>
           <p:nvPr/>
         </p:nvCxnSpPr>
         <p:spPr bwMode="auto">
           <a:xfrm>
-            <a:off x="5403600" y="1543307"/>
-            <a:ext cx="1290851" cy="721647"/>
+            <a:off x="3212327" y="3578087"/>
+            <a:ext cx="970059" cy="1677725"/>
           </a:xfrm>
           <a:prstGeom prst="straightConnector1">
             <a:avLst/>
@@ -4983,31 +5914,30 @@
           <a:solidFill>
             <a:schemeClr val="accent1"/>
           </a:solidFill>
-          <a:ln w="12700" cap="flat" cmpd="sng" algn="ctr">
+          <a:ln w="3175" cap="flat" cmpd="sng" algn="ctr">
             <a:solidFill>
-              <a:schemeClr val="tx1"/>
+              <a:schemeClr val="tx1">
+                <a:alpha val="35000"/>
+              </a:schemeClr>
             </a:solidFill>
             <a:prstDash val="solid"/>
             <a:round/>
             <a:headEnd type="none" w="med" len="med"/>
-            <a:tailEnd type="triangle"/>
+            <a:tailEnd type="arrow"/>
           </a:ln>
           <a:effectLst/>
         </p:spPr>
       </p:cxnSp>
       <p:cxnSp>
         <p:nvCxnSpPr>
-          <p:cNvPr id="25" name="직선 화살표 연결선 24"/>
-          <p:cNvCxnSpPr>
-            <a:stCxn id="5" idx="3"/>
-            <a:endCxn id="11" idx="1"/>
-          </p:cNvCxnSpPr>
+          <p:cNvPr id="27" name="직선 화살표 연결선 26"/>
+          <p:cNvCxnSpPr/>
           <p:nvPr/>
         </p:nvCxnSpPr>
         <p:spPr bwMode="auto">
           <a:xfrm>
-            <a:off x="5428050" y="2828604"/>
-            <a:ext cx="1266401" cy="763144"/>
+            <a:off x="3212327" y="3578087"/>
+            <a:ext cx="970059" cy="2393343"/>
           </a:xfrm>
           <a:prstGeom prst="straightConnector1">
             <a:avLst/>
@@ -5015,14 +5945,140 @@
           <a:solidFill>
             <a:schemeClr val="accent1"/>
           </a:solidFill>
-          <a:ln w="12700" cap="flat" cmpd="sng" algn="ctr">
+          <a:ln w="3175" cap="flat" cmpd="sng" algn="ctr">
             <a:solidFill>
-              <a:schemeClr val="tx1"/>
+              <a:schemeClr val="tx1">
+                <a:alpha val="35000"/>
+              </a:schemeClr>
             </a:solidFill>
             <a:prstDash val="solid"/>
             <a:round/>
             <a:headEnd type="none" w="med" len="med"/>
-            <a:tailEnd type="triangle"/>
+            <a:tailEnd type="arrow"/>
+          </a:ln>
+          <a:effectLst/>
+        </p:spPr>
+      </p:cxnSp>
+      <p:cxnSp>
+        <p:nvCxnSpPr>
+          <p:cNvPr id="30" name="직선 화살표 연결선 29"/>
+          <p:cNvCxnSpPr/>
+          <p:nvPr/>
+        </p:nvCxnSpPr>
+        <p:spPr bwMode="auto">
+          <a:xfrm>
+            <a:off x="4970891" y="1216551"/>
+            <a:ext cx="1090854" cy="2289974"/>
+          </a:xfrm>
+          <a:prstGeom prst="straightConnector1">
+            <a:avLst/>
+          </a:prstGeom>
+          <a:solidFill>
+            <a:schemeClr val="accent1"/>
+          </a:solidFill>
+          <a:ln w="3175" cap="flat" cmpd="sng" algn="ctr">
+            <a:solidFill>
+              <a:schemeClr val="tx1">
+                <a:alpha val="35000"/>
+              </a:schemeClr>
+            </a:solidFill>
+            <a:prstDash val="solid"/>
+            <a:round/>
+            <a:headEnd type="none" w="med" len="med"/>
+            <a:tailEnd type="arrow"/>
+          </a:ln>
+          <a:effectLst/>
+        </p:spPr>
+      </p:cxnSp>
+      <p:cxnSp>
+        <p:nvCxnSpPr>
+          <p:cNvPr id="39" name="직선 화살표 연결선 38"/>
+          <p:cNvCxnSpPr/>
+          <p:nvPr/>
+        </p:nvCxnSpPr>
+        <p:spPr bwMode="auto">
+          <a:xfrm>
+            <a:off x="4954988" y="1876508"/>
+            <a:ext cx="1106757" cy="1630017"/>
+          </a:xfrm>
+          <a:prstGeom prst="straightConnector1">
+            <a:avLst/>
+          </a:prstGeom>
+          <a:solidFill>
+            <a:schemeClr val="accent1"/>
+          </a:solidFill>
+          <a:ln w="3175" cap="flat" cmpd="sng" algn="ctr">
+            <a:solidFill>
+              <a:schemeClr val="tx1">
+                <a:alpha val="35000"/>
+              </a:schemeClr>
+            </a:solidFill>
+            <a:prstDash val="solid"/>
+            <a:round/>
+            <a:headEnd type="none" w="med" len="med"/>
+            <a:tailEnd type="arrow"/>
+          </a:ln>
+          <a:effectLst/>
+        </p:spPr>
+      </p:cxnSp>
+      <p:cxnSp>
+        <p:nvCxnSpPr>
+          <p:cNvPr id="41" name="직선 화살표 연결선 40"/>
+          <p:cNvCxnSpPr/>
+          <p:nvPr/>
+        </p:nvCxnSpPr>
+        <p:spPr bwMode="auto">
+          <a:xfrm>
+            <a:off x="4970891" y="2552370"/>
+            <a:ext cx="1090854" cy="954155"/>
+          </a:xfrm>
+          <a:prstGeom prst="straightConnector1">
+            <a:avLst/>
+          </a:prstGeom>
+          <a:solidFill>
+            <a:schemeClr val="accent1"/>
+          </a:solidFill>
+          <a:ln w="3175" cap="flat" cmpd="sng" algn="ctr">
+            <a:solidFill>
+              <a:schemeClr val="tx1">
+                <a:alpha val="35000"/>
+              </a:schemeClr>
+            </a:solidFill>
+            <a:prstDash val="solid"/>
+            <a:round/>
+            <a:headEnd type="none" w="med" len="med"/>
+            <a:tailEnd type="arrow"/>
+          </a:ln>
+          <a:effectLst/>
+        </p:spPr>
+      </p:cxnSp>
+      <p:cxnSp>
+        <p:nvCxnSpPr>
+          <p:cNvPr id="43" name="직선 화살표 연결선 42"/>
+          <p:cNvCxnSpPr/>
+          <p:nvPr/>
+        </p:nvCxnSpPr>
+        <p:spPr bwMode="auto">
+          <a:xfrm>
+            <a:off x="4970891" y="3220280"/>
+            <a:ext cx="1090854" cy="286245"/>
+          </a:xfrm>
+          <a:prstGeom prst="straightConnector1">
+            <a:avLst/>
+          </a:prstGeom>
+          <a:solidFill>
+            <a:schemeClr val="accent1"/>
+          </a:solidFill>
+          <a:ln w="3175" cap="flat" cmpd="sng" algn="ctr">
+            <a:solidFill>
+              <a:schemeClr val="tx1">
+                <a:alpha val="35000"/>
+              </a:schemeClr>
+            </a:solidFill>
+            <a:prstDash val="solid"/>
+            <a:round/>
+            <a:headEnd type="none" w="med" len="med"/>
+            <a:tailEnd type="arrow"/>
           </a:ln>
           <a:effectLst/>
         </p:spPr>
@@ -5030,7 +6086,7 @@
     </p:spTree>
     <p:extLst>
       <p:ext uri="{BB962C8B-B14F-4D97-AF65-F5344CB8AC3E}">
-        <p14:creationId xmlns:p14="http://schemas.microsoft.com/office/powerpoint/2010/main" val="121186760"/>
+        <p14:creationId xmlns:p14="http://schemas.microsoft.com/office/powerpoint/2010/main" val="1083093773"/>
       </p:ext>
     </p:extLst>
   </p:cSld>
@@ -5047,7 +6103,7 @@
 </p:sld>
 </file>
 
-<file path=ppt/slides/slide5.xml><?xml version="1.0" encoding="utf-8"?>
+<file path=ppt/slides/slide6.xml><?xml version="1.0" encoding="utf-8"?>
 <p:sld xmlns:a="http://schemas.openxmlformats.org/drawingml/2006/main" xmlns:r="http://schemas.openxmlformats.org/officeDocument/2006/relationships" xmlns:p="http://schemas.openxmlformats.org/presentationml/2006/main">
   <p:cSld>
     <p:spTree>

</xml_diff>

<commit_message>
# 서류 # Class Design_9_pigeon.pptx # UI Design Template_9_pigeon.pptx # 전반적 # 오류 정정 및 코더들의 의견 반영
</commit_message>
<xml_diff>
--- a/doc/3_ 설계서/Class Design_9_pigeon.pptx
+++ b/doc/3_ 설계서/Class Design_9_pigeon.pptx
@@ -147,7 +147,7 @@
   </p:defaultTextStyle>
   <p:extLst>
     <p:ext uri="{EFAFB233-063F-42B5-8137-9DF3F51BA10A}">
-      <p15:sldGuideLst xmlns:p15="http://schemas.microsoft.com/office/powerpoint/2012/main" xmlns="">
+      <p15:sldGuideLst xmlns:p15="http://schemas.microsoft.com/office/powerpoint/2012/main">
         <p15:guide id="1" orient="horz">
           <p15:clr>
             <a:srgbClr val="A4A3A4"/>
@@ -166,7 +166,7 @@
       </p15:sldGuideLst>
     </p:ext>
     <p:ext uri="{2D200454-40CA-4A62-9FC3-DE9A4176ACB9}">
-      <p15:notesGuideLst xmlns:p15="http://schemas.microsoft.com/office/powerpoint/2012/main" xmlns="">
+      <p15:notesGuideLst xmlns:p15="http://schemas.microsoft.com/office/powerpoint/2012/main">
         <p15:guide id="1" orient="horz" pos="3126">
           <p15:clr>
             <a:srgbClr val="A4A3A4"/>
@@ -3165,7 +3165,7 @@
             <p:ph idx="1"/>
             <p:extLst>
               <p:ext uri="{D42A27DB-BD31-4B8C-83A1-F6EECF244321}">
-                <p14:modId xmlns:p14="http://schemas.microsoft.com/office/powerpoint/2010/main" val="2108880988"/>
+                <p14:modId xmlns:p14="http://schemas.microsoft.com/office/powerpoint/2010/main" val="2199431655"/>
               </p:ext>
             </p:extLst>
           </p:nvPr>
@@ -3354,7 +3354,7 @@
                           <a:latin typeface="맑은 고딕" pitchFamily="50" charset="-127"/>
                           <a:ea typeface="맑은 고딕" pitchFamily="50" charset="-127"/>
                         </a:rPr>
-                        <a:t>1.0</a:t>
+                        <a:t>V1.0</a:t>
                       </a:r>
                       <a:endParaRPr lang="ko-KR" altLang="en-US" sz="1200" b="0" dirty="0">
                         <a:solidFill>
@@ -3385,7 +3385,7 @@
                           <a:latin typeface="맑은 고딕" pitchFamily="50" charset="-127"/>
                           <a:ea typeface="맑은 고딕" pitchFamily="50" charset="-127"/>
                         </a:rPr>
-                        <a:t>생성</a:t>
+                        <a:t>새로 생성</a:t>
                       </a:r>
                       <a:endParaRPr lang="ko-KR" altLang="en-US" sz="1200" b="0" dirty="0">
                         <a:solidFill>
@@ -3441,6 +3441,16 @@
                     <a:lstStyle/>
                     <a:p>
                       <a:pPr algn="ctr" latinLnBrk="1"/>
+                      <a:r>
+                        <a:rPr lang="en-US" altLang="ko-KR" sz="1200" b="0" dirty="0" smtClean="0">
+                          <a:solidFill>
+                            <a:schemeClr val="tx1"/>
+                          </a:solidFill>
+                          <a:latin typeface="맑은 고딕" pitchFamily="50" charset="-127"/>
+                          <a:ea typeface="맑은 고딕" pitchFamily="50" charset="-127"/>
+                        </a:rPr>
+                        <a:t>2017/05/25</a:t>
+                      </a:r>
                       <a:endParaRPr lang="ko-KR" altLang="en-US" sz="1200" b="0" dirty="0">
                         <a:solidFill>
                           <a:schemeClr val="tx1"/>
@@ -3462,6 +3472,16 @@
                     <a:lstStyle/>
                     <a:p>
                       <a:pPr algn="ctr" latinLnBrk="1"/>
+                      <a:r>
+                        <a:rPr lang="en-US" altLang="ko-KR" sz="1200" b="0" dirty="0" smtClean="0">
+                          <a:solidFill>
+                            <a:schemeClr val="tx1"/>
+                          </a:solidFill>
+                          <a:latin typeface="맑은 고딕" pitchFamily="50" charset="-127"/>
+                          <a:ea typeface="맑은 고딕" pitchFamily="50" charset="-127"/>
+                        </a:rPr>
+                        <a:t>V1.0</a:t>
+                      </a:r>
                       <a:endParaRPr lang="ko-KR" altLang="en-US" sz="1200" b="0" dirty="0">
                         <a:solidFill>
                           <a:schemeClr val="tx1"/>
@@ -3483,27 +3503,16 @@
                     <a:lstStyle/>
                     <a:p>
                       <a:pPr latinLnBrk="1"/>
-                      <a:endParaRPr lang="ko-KR" altLang="en-US" sz="1200" b="0">
-                        <a:solidFill>
-                          <a:schemeClr val="tx1"/>
-                        </a:solidFill>
-                        <a:latin typeface="맑은 고딕" pitchFamily="50" charset="-127"/>
-                        <a:ea typeface="맑은 고딕" pitchFamily="50" charset="-127"/>
-                      </a:endParaRPr>
-                    </a:p>
-                  </a:txBody>
-                  <a:tcPr anchor="ctr">
-                    <a:solidFill>
-                      <a:schemeClr val="bg1"/>
-                    </a:solidFill>
-                  </a:tcPr>
-                </a:tc>
-                <a:tc>
-                  <a:txBody>
-                    <a:bodyPr/>
-                    <a:lstStyle/>
-                    <a:p>
-                      <a:pPr algn="ctr" latinLnBrk="1"/>
+                      <a:r>
+                        <a:rPr lang="ko-KR" altLang="en-US" sz="1200" b="0" smtClean="0">
+                          <a:solidFill>
+                            <a:schemeClr val="tx1"/>
+                          </a:solidFill>
+                          <a:latin typeface="맑은 고딕" pitchFamily="50" charset="-127"/>
+                          <a:ea typeface="맑은 고딕" pitchFamily="50" charset="-127"/>
+                        </a:rPr>
+                        <a:t>새로 생성</a:t>
+                      </a:r>
                       <a:endParaRPr lang="ko-KR" altLang="en-US" sz="1200" b="0" dirty="0">
                         <a:solidFill>
                           <a:schemeClr val="tx1"/>
@@ -3519,14 +3528,22 @@
                     </a:solidFill>
                   </a:tcPr>
                 </a:tc>
-              </a:tr>
-              <a:tr h="370840">
                 <a:tc>
                   <a:txBody>
                     <a:bodyPr/>
                     <a:lstStyle/>
                     <a:p>
                       <a:pPr algn="ctr" latinLnBrk="1"/>
+                      <a:r>
+                        <a:rPr lang="ko-KR" altLang="en-US" sz="1200" b="0" dirty="0" smtClean="0">
+                          <a:solidFill>
+                            <a:schemeClr val="tx1"/>
+                          </a:solidFill>
+                          <a:latin typeface="맑은 고딕" pitchFamily="50" charset="-127"/>
+                          <a:ea typeface="맑은 고딕" pitchFamily="50" charset="-127"/>
+                        </a:rPr>
+                        <a:t>임정연</a:t>
+                      </a:r>
                       <a:endParaRPr lang="ko-KR" altLang="en-US" sz="1200" b="0" dirty="0">
                         <a:solidFill>
                           <a:schemeClr val="tx1"/>
@@ -3542,12 +3559,24 @@
                     </a:solidFill>
                   </a:tcPr>
                 </a:tc>
+              </a:tr>
+              <a:tr h="370840">
                 <a:tc>
                   <a:txBody>
                     <a:bodyPr/>
                     <a:lstStyle/>
                     <a:p>
                       <a:pPr algn="ctr" latinLnBrk="1"/>
+                      <a:r>
+                        <a:rPr lang="en-US" altLang="ko-KR" sz="1200" b="0" dirty="0" smtClean="0">
+                          <a:solidFill>
+                            <a:schemeClr val="tx1"/>
+                          </a:solidFill>
+                          <a:latin typeface="맑은 고딕" pitchFamily="50" charset="-127"/>
+                          <a:ea typeface="맑은 고딕" pitchFamily="50" charset="-127"/>
+                        </a:rPr>
+                        <a:t>2017/05/25</a:t>
+                      </a:r>
                       <a:endParaRPr lang="ko-KR" altLang="en-US" sz="1200" b="0" dirty="0">
                         <a:solidFill>
                           <a:schemeClr val="tx1"/>
@@ -3568,8 +3597,18 @@
                     <a:bodyPr/>
                     <a:lstStyle/>
                     <a:p>
-                      <a:pPr latinLnBrk="1"/>
-                      <a:endParaRPr lang="ko-KR" altLang="en-US" sz="1200" b="0">
+                      <a:pPr algn="ctr" latinLnBrk="1"/>
+                      <a:r>
+                        <a:rPr lang="en-US" altLang="ko-KR" sz="1200" b="0" dirty="0" smtClean="0">
+                          <a:solidFill>
+                            <a:schemeClr val="tx1"/>
+                          </a:solidFill>
+                          <a:latin typeface="맑은 고딕" pitchFamily="50" charset="-127"/>
+                          <a:ea typeface="맑은 고딕" pitchFamily="50" charset="-127"/>
+                        </a:rPr>
+                        <a:t>V1.1</a:t>
+                      </a:r>
+                      <a:endParaRPr lang="ko-KR" altLang="en-US" sz="1200" b="0" dirty="0">
                         <a:solidFill>
                           <a:schemeClr val="tx1"/>
                         </a:solidFill>
@@ -3589,7 +3628,48 @@
                     <a:bodyPr/>
                     <a:lstStyle/>
                     <a:p>
+                      <a:pPr latinLnBrk="1"/>
+                      <a:r>
+                        <a:rPr lang="ko-KR" altLang="en-US" sz="1200" b="0" dirty="0" smtClean="0">
+                          <a:solidFill>
+                            <a:schemeClr val="tx1"/>
+                          </a:solidFill>
+                          <a:latin typeface="맑은 고딕" pitchFamily="50" charset="-127"/>
+                          <a:ea typeface="맑은 고딕" pitchFamily="50" charset="-127"/>
+                        </a:rPr>
+                        <a:t>약간의 오류 정정</a:t>
+                      </a:r>
+                      <a:endParaRPr lang="ko-KR" altLang="en-US" sz="1200" b="0" dirty="0">
+                        <a:solidFill>
+                          <a:schemeClr val="tx1"/>
+                        </a:solidFill>
+                        <a:latin typeface="맑은 고딕" pitchFamily="50" charset="-127"/>
+                        <a:ea typeface="맑은 고딕" pitchFamily="50" charset="-127"/>
+                      </a:endParaRPr>
+                    </a:p>
+                  </a:txBody>
+                  <a:tcPr anchor="ctr">
+                    <a:solidFill>
+                      <a:schemeClr val="bg1"/>
+                    </a:solidFill>
+                  </a:tcPr>
+                </a:tc>
+                <a:tc>
+                  <a:txBody>
+                    <a:bodyPr/>
+                    <a:lstStyle/>
+                    <a:p>
                       <a:pPr algn="ctr" latinLnBrk="1"/>
+                      <a:r>
+                        <a:rPr lang="ko-KR" altLang="en-US" sz="1200" b="0" dirty="0" smtClean="0">
+                          <a:solidFill>
+                            <a:schemeClr val="tx1"/>
+                          </a:solidFill>
+                          <a:latin typeface="맑은 고딕" pitchFamily="50" charset="-127"/>
+                          <a:ea typeface="맑은 고딕" pitchFamily="50" charset="-127"/>
+                        </a:rPr>
+                        <a:t>김승현</a:t>
+                      </a:r>
                       <a:endParaRPr lang="ko-KR" altLang="en-US" sz="1200" b="0" dirty="0">
                         <a:solidFill>
                           <a:schemeClr val="tx1"/>
@@ -4019,7 +4099,7 @@
           <p:nvPr>
             <p:extLst>
               <p:ext uri="{D42A27DB-BD31-4B8C-83A1-F6EECF244321}">
-                <p14:modId xmlns:p14="http://schemas.microsoft.com/office/powerpoint/2010/main" val="1459176571"/>
+                <p14:modId xmlns:p14="http://schemas.microsoft.com/office/powerpoint/2010/main" val="2985880572"/>
               </p:ext>
             </p:extLst>
           </p:nvPr>
@@ -4045,8 +4125,8 @@
                     <a:p>
                       <a:pPr latinLnBrk="1"/>
                       <a:r>
-                        <a:rPr lang="ko-KR" altLang="en-US" dirty="0" err="1" smtClean="0"/>
-                        <a:t>기본창</a:t>
+                        <a:rPr lang="ko-KR" altLang="en-US" dirty="0" smtClean="0"/>
+                        <a:t>기본 창</a:t>
                       </a:r>
                       <a:r>
                         <a:rPr lang="en-US" altLang="ko-KR" dirty="0" smtClean="0"/>
@@ -4109,7 +4189,7 @@
           <p:nvPr>
             <p:extLst>
               <p:ext uri="{D42A27DB-BD31-4B8C-83A1-F6EECF244321}">
-                <p14:modId xmlns:p14="http://schemas.microsoft.com/office/powerpoint/2010/main" val="265182084"/>
+                <p14:modId xmlns:p14="http://schemas.microsoft.com/office/powerpoint/2010/main" val="1375693922"/>
               </p:ext>
             </p:extLst>
           </p:nvPr>
@@ -4122,7 +4202,7 @@
           <a:graphicData uri="http://schemas.openxmlformats.org/drawingml/2006/table">
             <a:tbl>
               <a:tblPr firstRow="1" bandRow="1">
-                <a:tableStyleId>{69CF1AB2-1976-4502-BF36-3FF5EA218861}</a:tableStyleId>
+                <a:tableStyleId>{5940675A-B579-460E-94D1-54222C63F5DA}</a:tableStyleId>
               </a:tblPr>
               <a:tblGrid>
                 <a:gridCol w="2049441"/>
@@ -4199,7 +4279,7 @@
           <p:nvPr>
             <p:extLst>
               <p:ext uri="{D42A27DB-BD31-4B8C-83A1-F6EECF244321}">
-                <p14:modId xmlns:p14="http://schemas.microsoft.com/office/powerpoint/2010/main" val="1443504248"/>
+                <p14:modId xmlns:p14="http://schemas.microsoft.com/office/powerpoint/2010/main" val="3864875800"/>
               </p:ext>
             </p:extLst>
           </p:nvPr>
@@ -4212,7 +4292,7 @@
           <a:graphicData uri="http://schemas.openxmlformats.org/drawingml/2006/table">
             <a:tbl>
               <a:tblPr firstRow="1" bandRow="1">
-                <a:tableStyleId>{69CF1AB2-1976-4502-BF36-3FF5EA218861}</a:tableStyleId>
+                <a:tableStyleId>{5940675A-B579-460E-94D1-54222C63F5DA}</a:tableStyleId>
               </a:tblPr>
               <a:tblGrid>
                 <a:gridCol w="2049441"/>
@@ -4289,7 +4369,7 @@
           <p:nvPr>
             <p:extLst>
               <p:ext uri="{D42A27DB-BD31-4B8C-83A1-F6EECF244321}">
-                <p14:modId xmlns:p14="http://schemas.microsoft.com/office/powerpoint/2010/main" val="3334336134"/>
+                <p14:modId xmlns:p14="http://schemas.microsoft.com/office/powerpoint/2010/main" val="2439772764"/>
               </p:ext>
             </p:extLst>
           </p:nvPr>
@@ -4302,7 +4382,7 @@
           <a:graphicData uri="http://schemas.openxmlformats.org/drawingml/2006/table">
             <a:tbl>
               <a:tblPr firstRow="1" bandRow="1">
-                <a:tableStyleId>{69CF1AB2-1976-4502-BF36-3FF5EA218861}</a:tableStyleId>
+                <a:tableStyleId>{5940675A-B579-460E-94D1-54222C63F5DA}</a:tableStyleId>
               </a:tblPr>
               <a:tblGrid>
                 <a:gridCol w="2058538"/>
@@ -4391,7 +4471,7 @@
           <p:nvPr>
             <p:extLst>
               <p:ext uri="{D42A27DB-BD31-4B8C-83A1-F6EECF244321}">
-                <p14:modId xmlns:p14="http://schemas.microsoft.com/office/powerpoint/2010/main" val="263970391"/>
+                <p14:modId xmlns:p14="http://schemas.microsoft.com/office/powerpoint/2010/main" val="3331446300"/>
               </p:ext>
             </p:extLst>
           </p:nvPr>
@@ -4404,7 +4484,7 @@
           <a:graphicData uri="http://schemas.openxmlformats.org/drawingml/2006/table">
             <a:tbl>
               <a:tblPr firstRow="1" bandRow="1">
-                <a:tableStyleId>{69CF1AB2-1976-4502-BF36-3FF5EA218861}</a:tableStyleId>
+                <a:tableStyleId>{5940675A-B579-460E-94D1-54222C63F5DA}</a:tableStyleId>
               </a:tblPr>
               <a:tblGrid>
                 <a:gridCol w="2058538"/>
@@ -4493,7 +4573,7 @@
           <p:nvPr>
             <p:extLst>
               <p:ext uri="{D42A27DB-BD31-4B8C-83A1-F6EECF244321}">
-                <p14:modId xmlns:p14="http://schemas.microsoft.com/office/powerpoint/2010/main" val="823577662"/>
+                <p14:modId xmlns:p14="http://schemas.microsoft.com/office/powerpoint/2010/main" val="3750075708"/>
               </p:ext>
             </p:extLst>
           </p:nvPr>
@@ -4506,7 +4586,7 @@
           <a:graphicData uri="http://schemas.openxmlformats.org/drawingml/2006/table">
             <a:tbl>
               <a:tblPr firstRow="1" bandRow="1">
-                <a:tableStyleId>{8A107856-5554-42FB-B03E-39F5DBC370BA}</a:tableStyleId>
+                <a:tableStyleId>{5940675A-B579-460E-94D1-54222C63F5DA}</a:tableStyleId>
               </a:tblPr>
               <a:tblGrid>
                 <a:gridCol w="2166057"/>
@@ -4583,7 +4663,7 @@
           <p:nvPr>
             <p:extLst>
               <p:ext uri="{D42A27DB-BD31-4B8C-83A1-F6EECF244321}">
-                <p14:modId xmlns:p14="http://schemas.microsoft.com/office/powerpoint/2010/main" val="781927584"/>
+                <p14:modId xmlns:p14="http://schemas.microsoft.com/office/powerpoint/2010/main" val="2865642705"/>
               </p:ext>
             </p:extLst>
           </p:nvPr>
@@ -4596,7 +4676,7 @@
           <a:graphicData uri="http://schemas.openxmlformats.org/drawingml/2006/table">
             <a:tbl>
               <a:tblPr firstRow="1" bandRow="1">
-                <a:tableStyleId>{8A107856-5554-42FB-B03E-39F5DBC370BA}</a:tableStyleId>
+                <a:tableStyleId>{5940675A-B579-460E-94D1-54222C63F5DA}</a:tableStyleId>
               </a:tblPr>
               <a:tblGrid>
                 <a:gridCol w="2166057"/>
@@ -6153,7 +6233,7 @@
           <p:nvPr>
             <p:extLst>
               <p:ext uri="{D42A27DB-BD31-4B8C-83A1-F6EECF244321}">
-                <p14:modId xmlns:p14="http://schemas.microsoft.com/office/powerpoint/2010/main" val="2807456157"/>
+                <p14:modId xmlns:p14="http://schemas.microsoft.com/office/powerpoint/2010/main" val="2752499141"/>
               </p:ext>
             </p:extLst>
           </p:nvPr>
@@ -6183,8 +6263,8 @@
                         <a:t>과제 </a:t>
                       </a:r>
                       <a:r>
-                        <a:rPr lang="ko-KR" altLang="en-US" dirty="0" err="1" smtClean="0"/>
-                        <a:t>등록창</a:t>
+                        <a:rPr lang="ko-KR" altLang="en-US" dirty="0" smtClean="0"/>
+                        <a:t>등록 창</a:t>
                       </a:r>
                       <a:r>
                         <a:rPr lang="en-US" altLang="ko-KR" dirty="0" smtClean="0"/>
@@ -6247,7 +6327,7 @@
           <p:nvPr>
             <p:extLst>
               <p:ext uri="{D42A27DB-BD31-4B8C-83A1-F6EECF244321}">
-                <p14:modId xmlns:p14="http://schemas.microsoft.com/office/powerpoint/2010/main" val="3866902870"/>
+                <p14:modId xmlns:p14="http://schemas.microsoft.com/office/powerpoint/2010/main" val="2656407487"/>
               </p:ext>
             </p:extLst>
           </p:nvPr>
@@ -6260,7 +6340,7 @@
           <a:graphicData uri="http://schemas.openxmlformats.org/drawingml/2006/table">
             <a:tbl>
               <a:tblPr firstRow="1" bandRow="1">
-                <a:tableStyleId>{8A107856-5554-42FB-B03E-39F5DBC370BA}</a:tableStyleId>
+                <a:tableStyleId>{5940675A-B579-460E-94D1-54222C63F5DA}</a:tableStyleId>
               </a:tblPr>
               <a:tblGrid>
                 <a:gridCol w="1429020"/>
@@ -6329,7 +6409,7 @@
           <p:nvPr>
             <p:extLst>
               <p:ext uri="{D42A27DB-BD31-4B8C-83A1-F6EECF244321}">
-                <p14:modId xmlns:p14="http://schemas.microsoft.com/office/powerpoint/2010/main" val="13058268"/>
+                <p14:modId xmlns:p14="http://schemas.microsoft.com/office/powerpoint/2010/main" val="541545970"/>
               </p:ext>
             </p:extLst>
           </p:nvPr>
@@ -6342,7 +6422,7 @@
           <a:graphicData uri="http://schemas.openxmlformats.org/drawingml/2006/table">
             <a:tbl>
               <a:tblPr firstRow="1" bandRow="1">
-                <a:tableStyleId>{69CF1AB2-1976-4502-BF36-3FF5EA218861}</a:tableStyleId>
+                <a:tableStyleId>{5940675A-B579-460E-94D1-54222C63F5DA}</a:tableStyleId>
               </a:tblPr>
               <a:tblGrid>
                 <a:gridCol w="1801284"/>
@@ -6439,7 +6519,7 @@
           <p:nvPr>
             <p:extLst>
               <p:ext uri="{D42A27DB-BD31-4B8C-83A1-F6EECF244321}">
-                <p14:modId xmlns:p14="http://schemas.microsoft.com/office/powerpoint/2010/main" val="3768360355"/>
+                <p14:modId xmlns:p14="http://schemas.microsoft.com/office/powerpoint/2010/main" val="358603355"/>
               </p:ext>
             </p:extLst>
           </p:nvPr>
@@ -6452,7 +6532,7 @@
           <a:graphicData uri="http://schemas.openxmlformats.org/drawingml/2006/table">
             <a:tbl>
               <a:tblPr firstRow="1" bandRow="1">
-                <a:tableStyleId>{69CF1AB2-1976-4502-BF36-3FF5EA218861}</a:tableStyleId>
+                <a:tableStyleId>{5940675A-B579-460E-94D1-54222C63F5DA}</a:tableStyleId>
               </a:tblPr>
               <a:tblGrid>
                 <a:gridCol w="1801284"/>
@@ -6529,23 +6609,23 @@
           <p:nvPr>
             <p:extLst>
               <p:ext uri="{D42A27DB-BD31-4B8C-83A1-F6EECF244321}">
-                <p14:modId xmlns:p14="http://schemas.microsoft.com/office/powerpoint/2010/main" val="2741438397"/>
+                <p14:modId xmlns:p14="http://schemas.microsoft.com/office/powerpoint/2010/main" val="2894363828"/>
               </p:ext>
             </p:extLst>
           </p:nvPr>
         </p:nvGraphicFramePr>
         <p:xfrm>
           <a:off x="3671478" y="3030989"/>
-          <a:ext cx="1801284" cy="834853"/>
+          <a:ext cx="1744165" cy="834853"/>
         </p:xfrm>
         <a:graphic>
           <a:graphicData uri="http://schemas.openxmlformats.org/drawingml/2006/table">
             <a:tbl>
               <a:tblPr firstRow="1" bandRow="1">
-                <a:tableStyleId>{69CF1AB2-1976-4502-BF36-3FF5EA218861}</a:tableStyleId>
+                <a:tableStyleId>{5940675A-B579-460E-94D1-54222C63F5DA}</a:tableStyleId>
               </a:tblPr>
               <a:tblGrid>
-                <a:gridCol w="1801284"/>
+                <a:gridCol w="1744165"/>
               </a:tblGrid>
               <a:tr h="198385">
                 <a:tc>
@@ -6619,7 +6699,7 @@
           <p:nvPr>
             <p:extLst>
               <p:ext uri="{D42A27DB-BD31-4B8C-83A1-F6EECF244321}">
-                <p14:modId xmlns:p14="http://schemas.microsoft.com/office/powerpoint/2010/main" val="1633330877"/>
+                <p14:modId xmlns:p14="http://schemas.microsoft.com/office/powerpoint/2010/main" val="1822699078"/>
               </p:ext>
             </p:extLst>
           </p:nvPr>
@@ -6632,7 +6712,7 @@
           <a:graphicData uri="http://schemas.openxmlformats.org/drawingml/2006/table">
             <a:tbl>
               <a:tblPr firstRow="1" bandRow="1">
-                <a:tableStyleId>{69CF1AB2-1976-4502-BF36-3FF5EA218861}</a:tableStyleId>
+                <a:tableStyleId>{5940675A-B579-460E-94D1-54222C63F5DA}</a:tableStyleId>
               </a:tblPr>
               <a:tblGrid>
                 <a:gridCol w="1801284"/>
@@ -6709,7 +6789,7 @@
           <p:nvPr>
             <p:extLst>
               <p:ext uri="{D42A27DB-BD31-4B8C-83A1-F6EECF244321}">
-                <p14:modId xmlns:p14="http://schemas.microsoft.com/office/powerpoint/2010/main" val="1465164426"/>
+                <p14:modId xmlns:p14="http://schemas.microsoft.com/office/powerpoint/2010/main" val="3519673704"/>
               </p:ext>
             </p:extLst>
           </p:nvPr>
@@ -6722,7 +6802,7 @@
           <a:graphicData uri="http://schemas.openxmlformats.org/drawingml/2006/table">
             <a:tbl>
               <a:tblPr firstRow="1" bandRow="1">
-                <a:tableStyleId>{69CF1AB2-1976-4502-BF36-3FF5EA218861}</a:tableStyleId>
+                <a:tableStyleId>{5940675A-B579-460E-94D1-54222C63F5DA}</a:tableStyleId>
               </a:tblPr>
               <a:tblGrid>
                 <a:gridCol w="1801284"/>
@@ -6827,7 +6907,7 @@
           <p:nvPr>
             <p:extLst>
               <p:ext uri="{D42A27DB-BD31-4B8C-83A1-F6EECF244321}">
-                <p14:modId xmlns:p14="http://schemas.microsoft.com/office/powerpoint/2010/main" val="4215671687"/>
+                <p14:modId xmlns:p14="http://schemas.microsoft.com/office/powerpoint/2010/main" val="2691399764"/>
               </p:ext>
             </p:extLst>
           </p:nvPr>
@@ -6840,7 +6920,7 @@
           <a:graphicData uri="http://schemas.openxmlformats.org/drawingml/2006/table">
             <a:tbl>
               <a:tblPr firstRow="1" bandRow="1">
-                <a:tableStyleId>{8A107856-5554-42FB-B03E-39F5DBC370BA}</a:tableStyleId>
+                <a:tableStyleId>{5940675A-B579-460E-94D1-54222C63F5DA}</a:tableStyleId>
               </a:tblPr>
               <a:tblGrid>
                 <a:gridCol w="1429020"/>
@@ -6917,7 +6997,7 @@
           <p:nvPr>
             <p:extLst>
               <p:ext uri="{D42A27DB-BD31-4B8C-83A1-F6EECF244321}">
-                <p14:modId xmlns:p14="http://schemas.microsoft.com/office/powerpoint/2010/main" val="2818657987"/>
+                <p14:modId xmlns:p14="http://schemas.microsoft.com/office/powerpoint/2010/main" val="3239201628"/>
               </p:ext>
             </p:extLst>
           </p:nvPr>
@@ -6930,7 +7010,7 @@
           <a:graphicData uri="http://schemas.openxmlformats.org/drawingml/2006/table">
             <a:tbl>
               <a:tblPr firstRow="1" bandRow="1">
-                <a:tableStyleId>{8A107856-5554-42FB-B03E-39F5DBC370BA}</a:tableStyleId>
+                <a:tableStyleId>{5940675A-B579-460E-94D1-54222C63F5DA}</a:tableStyleId>
               </a:tblPr>
               <a:tblGrid>
                 <a:gridCol w="1429020"/>
@@ -7015,7 +7095,7 @@
           <p:nvPr>
             <p:extLst>
               <p:ext uri="{D42A27DB-BD31-4B8C-83A1-F6EECF244321}">
-                <p14:modId xmlns:p14="http://schemas.microsoft.com/office/powerpoint/2010/main" val="3067674256"/>
+                <p14:modId xmlns:p14="http://schemas.microsoft.com/office/powerpoint/2010/main" val="1273973165"/>
               </p:ext>
             </p:extLst>
           </p:nvPr>
@@ -7028,7 +7108,7 @@
           <a:graphicData uri="http://schemas.openxmlformats.org/drawingml/2006/table">
             <a:tbl>
               <a:tblPr firstRow="1" bandRow="1">
-                <a:tableStyleId>{8A107856-5554-42FB-B03E-39F5DBC370BA}</a:tableStyleId>
+                <a:tableStyleId>{5940675A-B579-460E-94D1-54222C63F5DA}</a:tableStyleId>
               </a:tblPr>
               <a:tblGrid>
                 <a:gridCol w="1429020"/>
@@ -7113,7 +7193,7 @@
           <p:nvPr>
             <p:extLst>
               <p:ext uri="{D42A27DB-BD31-4B8C-83A1-F6EECF244321}">
-                <p14:modId xmlns:p14="http://schemas.microsoft.com/office/powerpoint/2010/main" val="3360777653"/>
+                <p14:modId xmlns:p14="http://schemas.microsoft.com/office/powerpoint/2010/main" val="1071745484"/>
               </p:ext>
             </p:extLst>
           </p:nvPr>
@@ -7126,7 +7206,7 @@
           <a:graphicData uri="http://schemas.openxmlformats.org/drawingml/2006/table">
             <a:tbl>
               <a:tblPr firstRow="1" bandRow="1">
-                <a:tableStyleId>{8A107856-5554-42FB-B03E-39F5DBC370BA}</a:tableStyleId>
+                <a:tableStyleId>{5940675A-B579-460E-94D1-54222C63F5DA}</a:tableStyleId>
               </a:tblPr>
               <a:tblGrid>
                 <a:gridCol w="1429020"/>
@@ -7375,14 +7455,12 @@
       <p:cxnSp>
         <p:nvCxnSpPr>
           <p:cNvPr id="35" name="직선 화살표 연결선 34"/>
-          <p:cNvCxnSpPr>
-            <a:endCxn id="19" idx="1"/>
-          </p:cNvCxnSpPr>
+          <p:cNvCxnSpPr/>
           <p:nvPr/>
         </p:nvCxnSpPr>
         <p:spPr bwMode="auto">
           <a:xfrm>
-            <a:off x="5472762" y="2374900"/>
+            <a:off x="5472762" y="2338428"/>
             <a:ext cx="1111735" cy="3125106"/>
           </a:xfrm>
           <a:prstGeom prst="straightConnector1">
@@ -7407,14 +7485,15 @@
         <p:nvCxnSpPr>
           <p:cNvPr id="37" name="직선 연결선 36"/>
           <p:cNvCxnSpPr>
+            <a:stCxn id="13" idx="3"/>
             <a:endCxn id="16" idx="1"/>
           </p:cNvCxnSpPr>
           <p:nvPr/>
         </p:nvCxnSpPr>
         <p:spPr bwMode="auto">
           <a:xfrm flipV="1">
-            <a:off x="5472762" y="2374900"/>
-            <a:ext cx="1057144" cy="1073515"/>
+            <a:off x="5415643" y="2374900"/>
+            <a:ext cx="1114263" cy="1073515"/>
           </a:xfrm>
           <a:prstGeom prst="line">
             <a:avLst/>
@@ -7445,8 +7524,8 @@
         </p:nvCxnSpPr>
         <p:spPr bwMode="auto">
           <a:xfrm flipV="1">
-            <a:off x="5472762" y="3390900"/>
-            <a:ext cx="1057144" cy="57515"/>
+            <a:off x="5415643" y="3390900"/>
+            <a:ext cx="1114263" cy="57515"/>
           </a:xfrm>
           <a:prstGeom prst="line">
             <a:avLst/>
@@ -7477,8 +7556,8 @@
         </p:nvCxnSpPr>
         <p:spPr bwMode="auto">
           <a:xfrm>
-            <a:off x="5472762" y="3448415"/>
-            <a:ext cx="1111735" cy="1000766"/>
+            <a:off x="5415643" y="3448415"/>
+            <a:ext cx="1168854" cy="1000766"/>
           </a:xfrm>
           <a:prstGeom prst="line">
             <a:avLst/>
@@ -7503,14 +7582,14 @@
           <p:cNvPr id="44" name="직선 연결선 43"/>
           <p:cNvCxnSpPr>
             <a:stCxn id="12" idx="3"/>
-            <a:endCxn id="16" idx="1"/>
+            <a:endCxn id="6" idx="1"/>
           </p:cNvCxnSpPr>
           <p:nvPr/>
         </p:nvCxnSpPr>
         <p:spPr bwMode="auto">
           <a:xfrm flipV="1">
-            <a:off x="5472762" y="2374900"/>
-            <a:ext cx="1057144" cy="2128866"/>
+            <a:off x="5472762" y="1412956"/>
+            <a:ext cx="1057144" cy="3090810"/>
           </a:xfrm>
           <a:prstGeom prst="line">
             <a:avLst/>
@@ -7532,19 +7611,18 @@
       </p:cxnSp>
       <p:cxnSp>
         <p:nvCxnSpPr>
-          <p:cNvPr id="47" name="직선 연결선 46"/>
+          <p:cNvPr id="8" name="직선 화살표 연결선 7"/>
           <p:cNvCxnSpPr>
-            <a:stCxn id="12" idx="3"/>
-            <a:endCxn id="17" idx="1"/>
+            <a:endCxn id="6" idx="1"/>
           </p:cNvCxnSpPr>
           <p:nvPr/>
         </p:nvCxnSpPr>
         <p:spPr bwMode="auto">
           <a:xfrm flipV="1">
-            <a:off x="5472762" y="3390900"/>
-            <a:ext cx="1057144" cy="1112866"/>
+            <a:off x="5472762" y="1412956"/>
+            <a:ext cx="1057144" cy="961943"/>
           </a:xfrm>
-          <a:prstGeom prst="line">
+          <a:prstGeom prst="straightConnector1">
             <a:avLst/>
           </a:prstGeom>
           <a:solidFill>
@@ -7557,26 +7635,25 @@
             <a:prstDash val="solid"/>
             <a:round/>
             <a:headEnd type="none" w="med" len="med"/>
-            <a:tailEnd type="none" w="med" len="med"/>
+            <a:tailEnd type="triangle"/>
           </a:ln>
           <a:effectLst/>
         </p:spPr>
       </p:cxnSp>
       <p:cxnSp>
         <p:nvCxnSpPr>
-          <p:cNvPr id="50" name="직선 연결선 49"/>
+          <p:cNvPr id="22" name="직선 화살표 연결선 21"/>
           <p:cNvCxnSpPr>
-            <a:stCxn id="12" idx="3"/>
-            <a:endCxn id="18" idx="1"/>
+            <a:endCxn id="16" idx="1"/>
           </p:cNvCxnSpPr>
           <p:nvPr/>
         </p:nvCxnSpPr>
         <p:spPr bwMode="auto">
           <a:xfrm flipV="1">
-            <a:off x="5472762" y="4449181"/>
-            <a:ext cx="1111735" cy="54585"/>
+            <a:off x="5415643" y="2374900"/>
+            <a:ext cx="1114263" cy="1072428"/>
           </a:xfrm>
-          <a:prstGeom prst="line">
+          <a:prstGeom prst="straightConnector1">
             <a:avLst/>
           </a:prstGeom>
           <a:solidFill>
@@ -7589,7 +7666,100 @@
             <a:prstDash val="solid"/>
             <a:round/>
             <a:headEnd type="none" w="med" len="med"/>
-            <a:tailEnd type="none" w="med" len="med"/>
+            <a:tailEnd type="triangle"/>
+          </a:ln>
+          <a:effectLst/>
+        </p:spPr>
+      </p:cxnSp>
+      <p:cxnSp>
+        <p:nvCxnSpPr>
+          <p:cNvPr id="26" name="직선 화살표 연결선 25"/>
+          <p:cNvCxnSpPr>
+            <a:endCxn id="17" idx="1"/>
+          </p:cNvCxnSpPr>
+          <p:nvPr/>
+        </p:nvCxnSpPr>
+        <p:spPr bwMode="auto">
+          <a:xfrm flipV="1">
+            <a:off x="5415643" y="3390900"/>
+            <a:ext cx="1114263" cy="56428"/>
+          </a:xfrm>
+          <a:prstGeom prst="straightConnector1">
+            <a:avLst/>
+          </a:prstGeom>
+          <a:solidFill>
+            <a:schemeClr val="accent1"/>
+          </a:solidFill>
+          <a:ln w="12700" cap="flat" cmpd="sng" algn="ctr">
+            <a:solidFill>
+              <a:schemeClr val="tx1"/>
+            </a:solidFill>
+            <a:prstDash val="solid"/>
+            <a:round/>
+            <a:headEnd type="none" w="med" len="med"/>
+            <a:tailEnd type="triangle"/>
+          </a:ln>
+          <a:effectLst/>
+        </p:spPr>
+      </p:cxnSp>
+      <p:cxnSp>
+        <p:nvCxnSpPr>
+          <p:cNvPr id="30" name="직선 화살표 연결선 29"/>
+          <p:cNvCxnSpPr>
+            <a:endCxn id="18" idx="1"/>
+          </p:cNvCxnSpPr>
+          <p:nvPr/>
+        </p:nvCxnSpPr>
+        <p:spPr bwMode="auto">
+          <a:xfrm>
+            <a:off x="5415643" y="3448415"/>
+            <a:ext cx="1168854" cy="1000766"/>
+          </a:xfrm>
+          <a:prstGeom prst="straightConnector1">
+            <a:avLst/>
+          </a:prstGeom>
+          <a:solidFill>
+            <a:schemeClr val="accent1"/>
+          </a:solidFill>
+          <a:ln w="12700" cap="flat" cmpd="sng" algn="ctr">
+            <a:solidFill>
+              <a:schemeClr val="tx1"/>
+            </a:solidFill>
+            <a:prstDash val="solid"/>
+            <a:round/>
+            <a:headEnd type="none" w="med" len="med"/>
+            <a:tailEnd type="triangle"/>
+          </a:ln>
+          <a:effectLst/>
+        </p:spPr>
+      </p:cxnSp>
+      <p:cxnSp>
+        <p:nvCxnSpPr>
+          <p:cNvPr id="34" name="직선 화살표 연결선 33"/>
+          <p:cNvCxnSpPr>
+            <a:endCxn id="6" idx="1"/>
+          </p:cNvCxnSpPr>
+          <p:nvPr/>
+        </p:nvCxnSpPr>
+        <p:spPr bwMode="auto">
+          <a:xfrm flipV="1">
+            <a:off x="5472762" y="1412956"/>
+            <a:ext cx="1057144" cy="3097604"/>
+          </a:xfrm>
+          <a:prstGeom prst="straightConnector1">
+            <a:avLst/>
+          </a:prstGeom>
+          <a:solidFill>
+            <a:schemeClr val="accent1"/>
+          </a:solidFill>
+          <a:ln w="12700" cap="flat" cmpd="sng" algn="ctr">
+            <a:solidFill>
+              <a:schemeClr val="tx1"/>
+            </a:solidFill>
+            <a:prstDash val="solid"/>
+            <a:round/>
+            <a:headEnd type="none" w="med" len="med"/>
+            <a:tailEnd type="triangle"/>
           </a:ln>
           <a:effectLst/>
         </p:spPr>

</xml_diff>

<commit_message>
# 서류 # Class Design_9_pigeon.pptx, UI Design Template_9_pigeon.pptx # Class Design_9_pigeon.pptx 4,5p   UI Design Template_9_pigeon.pptx 7,8,9,10p # 오류 정정 및 코더 의견 반영
</commit_message>
<xml_diff>
--- a/doc/3_ 설계서/Class Design_9_pigeon.pptx
+++ b/doc/3_ 설계서/Class Design_9_pigeon.pptx
@@ -147,7 +147,7 @@
   </p:defaultTextStyle>
   <p:extLst>
     <p:ext uri="{EFAFB233-063F-42B5-8137-9DF3F51BA10A}">
-      <p15:sldGuideLst xmlns:p15="http://schemas.microsoft.com/office/powerpoint/2012/main">
+      <p15:sldGuideLst xmlns:p15="http://schemas.microsoft.com/office/powerpoint/2012/main" xmlns="">
         <p15:guide id="1" orient="horz">
           <p15:clr>
             <a:srgbClr val="A4A3A4"/>
@@ -166,7 +166,7 @@
       </p15:sldGuideLst>
     </p:ext>
     <p:ext uri="{2D200454-40CA-4A62-9FC3-DE9A4176ACB9}">
-      <p15:notesGuideLst xmlns:p15="http://schemas.microsoft.com/office/powerpoint/2012/main">
+      <p15:notesGuideLst xmlns:p15="http://schemas.microsoft.com/office/powerpoint/2012/main" xmlns="">
         <p15:guide id="1" orient="horz" pos="3126">
           <p15:clr>
             <a:srgbClr val="A4A3A4"/>
@@ -3148,9 +3148,12 @@
           <a:p>
             <a:pPr algn="r"/>
             <a:r>
-              <a:rPr lang="ko-KR" altLang="en-US" dirty="0" smtClean="0"/>
-              <a:t>팀 명</a:t>
+              <a:rPr lang="en-US" altLang="ko-KR" dirty="0"/>
+              <a:t>Pigeon</a:t>
             </a:r>
+          </a:p>
+          <a:p>
+            <a:pPr algn="r"/>
             <a:endParaRPr lang="en-US" altLang="ko-KR" dirty="0"/>
           </a:p>
         </p:txBody>
@@ -3165,7 +3168,7 @@
             <p:ph idx="1"/>
             <p:extLst>
               <p:ext uri="{D42A27DB-BD31-4B8C-83A1-F6EECF244321}">
-                <p14:modId xmlns:p14="http://schemas.microsoft.com/office/powerpoint/2010/main" val="2199431655"/>
+                <p14:modId xmlns:p14="http://schemas.microsoft.com/office/powerpoint/2010/main" val="2017531399"/>
               </p:ext>
             </p:extLst>
           </p:nvPr>
@@ -3693,27 +3696,16 @@
                     <a:lstStyle/>
                     <a:p>
                       <a:pPr algn="ctr" latinLnBrk="1"/>
-                      <a:endParaRPr lang="ko-KR" altLang="en-US" sz="1200" b="0">
-                        <a:solidFill>
-                          <a:schemeClr val="tx1"/>
-                        </a:solidFill>
-                        <a:latin typeface="맑은 고딕" pitchFamily="50" charset="-127"/>
-                        <a:ea typeface="맑은 고딕" pitchFamily="50" charset="-127"/>
-                      </a:endParaRPr>
-                    </a:p>
-                  </a:txBody>
-                  <a:tcPr anchor="ctr">
-                    <a:solidFill>
-                      <a:schemeClr val="bg1"/>
-                    </a:solidFill>
-                  </a:tcPr>
-                </a:tc>
-                <a:tc>
-                  <a:txBody>
-                    <a:bodyPr/>
-                    <a:lstStyle/>
-                    <a:p>
-                      <a:pPr algn="ctr" latinLnBrk="1"/>
+                      <a:r>
+                        <a:rPr lang="en-US" altLang="ko-KR" sz="1200" b="0" dirty="0" smtClean="0">
+                          <a:solidFill>
+                            <a:schemeClr val="tx1"/>
+                          </a:solidFill>
+                          <a:latin typeface="맑은 고딕" pitchFamily="50" charset="-127"/>
+                          <a:ea typeface="맑은 고딕" pitchFamily="50" charset="-127"/>
+                        </a:rPr>
+                        <a:t>2017/05/26</a:t>
+                      </a:r>
                       <a:endParaRPr lang="ko-KR" altLang="en-US" sz="1200" b="0" dirty="0">
                         <a:solidFill>
                           <a:schemeClr val="tx1"/>
@@ -3734,7 +3726,17 @@
                     <a:bodyPr/>
                     <a:lstStyle/>
                     <a:p>
-                      <a:pPr latinLnBrk="1"/>
+                      <a:pPr algn="ctr" latinLnBrk="1"/>
+                      <a:r>
+                        <a:rPr lang="en-US" altLang="ko-KR" sz="1200" b="0" dirty="0" smtClean="0">
+                          <a:solidFill>
+                            <a:schemeClr val="tx1"/>
+                          </a:solidFill>
+                          <a:latin typeface="맑은 고딕" pitchFamily="50" charset="-127"/>
+                          <a:ea typeface="맑은 고딕" pitchFamily="50" charset="-127"/>
+                        </a:rPr>
+                        <a:t>V1.1</a:t>
+                      </a:r>
                       <a:endParaRPr lang="ko-KR" altLang="en-US" sz="1200" b="0" dirty="0">
                         <a:solidFill>
                           <a:schemeClr val="tx1"/>
@@ -3755,7 +3757,48 @@
                     <a:bodyPr/>
                     <a:lstStyle/>
                     <a:p>
+                      <a:pPr latinLnBrk="1"/>
+                      <a:r>
+                        <a:rPr lang="ko-KR" altLang="en-US" sz="1200" b="0" dirty="0" smtClean="0">
+                          <a:solidFill>
+                            <a:schemeClr val="tx1"/>
+                          </a:solidFill>
+                          <a:latin typeface="맑은 고딕" pitchFamily="50" charset="-127"/>
+                          <a:ea typeface="맑은 고딕" pitchFamily="50" charset="-127"/>
+                        </a:rPr>
+                        <a:t>약간의 오류 정정</a:t>
+                      </a:r>
+                      <a:endParaRPr lang="ko-KR" altLang="en-US" sz="1200" b="0" dirty="0">
+                        <a:solidFill>
+                          <a:schemeClr val="tx1"/>
+                        </a:solidFill>
+                        <a:latin typeface="맑은 고딕" pitchFamily="50" charset="-127"/>
+                        <a:ea typeface="맑은 고딕" pitchFamily="50" charset="-127"/>
+                      </a:endParaRPr>
+                    </a:p>
+                  </a:txBody>
+                  <a:tcPr anchor="ctr">
+                    <a:solidFill>
+                      <a:schemeClr val="bg1"/>
+                    </a:solidFill>
+                  </a:tcPr>
+                </a:tc>
+                <a:tc>
+                  <a:txBody>
+                    <a:bodyPr/>
+                    <a:lstStyle/>
+                    <a:p>
                       <a:pPr algn="ctr" latinLnBrk="1"/>
+                      <a:r>
+                        <a:rPr lang="ko-KR" altLang="en-US" sz="1200" b="0" dirty="0" smtClean="0">
+                          <a:solidFill>
+                            <a:schemeClr val="tx1"/>
+                          </a:solidFill>
+                          <a:latin typeface="맑은 고딕" pitchFamily="50" charset="-127"/>
+                          <a:ea typeface="맑은 고딕" pitchFamily="50" charset="-127"/>
+                        </a:rPr>
+                        <a:t>임정연</a:t>
+                      </a:r>
                       <a:endParaRPr lang="ko-KR" altLang="en-US" sz="1200" b="0" dirty="0">
                         <a:solidFill>
                           <a:schemeClr val="tx1"/>
@@ -4083,8 +4126,8 @@
           <a:p>
             <a:pPr algn="r"/>
             <a:r>
-              <a:rPr lang="ko-KR" altLang="en-US" smtClean="0"/>
-              <a:t>팀 명</a:t>
+              <a:rPr lang="en-US" altLang="ko-KR" dirty="0" smtClean="0"/>
+              <a:t>Pigeon</a:t>
             </a:r>
             <a:endParaRPr lang="en-US" altLang="ko-KR" dirty="0"/>
           </a:p>
@@ -4980,7 +5023,7 @@
       </p:grpSpPr>
       <p:pic>
         <p:nvPicPr>
-          <p:cNvPr id="1030" name="Picture 6"/>
+          <p:cNvPr id="1028" name="Picture 4"/>
           <p:cNvPicPr>
             <a:picLocks noChangeAspect="1" noChangeArrowheads="1"/>
           </p:cNvPicPr>
@@ -5001,8 +5044,8 @@
         </p:blipFill>
         <p:spPr bwMode="auto">
           <a:xfrm>
-            <a:off x="2162754" y="864752"/>
-            <a:ext cx="4977516" cy="5472437"/>
+            <a:off x="2339018" y="826361"/>
+            <a:ext cx="4410075" cy="5471483"/>
           </a:xfrm>
           <a:prstGeom prst="rect">
             <a:avLst/>
@@ -5042,16 +5085,24 @@
             <p:ph type="ftr" sz="quarter" idx="3"/>
           </p:nvPr>
         </p:nvSpPr>
-        <p:spPr/>
+        <p:spPr>
+          <a:xfrm>
+            <a:off x="6061745" y="6470650"/>
+            <a:ext cx="2798763" cy="300038"/>
+          </a:xfrm>
+        </p:spPr>
         <p:txBody>
           <a:bodyPr/>
           <a:lstStyle/>
           <a:p>
             <a:pPr algn="r"/>
             <a:r>
-              <a:rPr lang="ko-KR" altLang="en-US" smtClean="0"/>
-              <a:t>팀 명</a:t>
+              <a:rPr lang="en-US" altLang="ko-KR" dirty="0"/>
+              <a:t>Pigeon</a:t>
             </a:r>
+          </a:p>
+          <a:p>
+            <a:pPr algn="r"/>
             <a:endParaRPr lang="en-US" altLang="ko-KR" dirty="0"/>
           </a:p>
         </p:txBody>
@@ -5064,8 +5115,8 @@
         </p:nvCxnSpPr>
         <p:spPr bwMode="auto">
           <a:xfrm flipV="1">
-            <a:off x="3156668" y="1129085"/>
-            <a:ext cx="1025718" cy="2250219"/>
+            <a:off x="3190208" y="1129086"/>
+            <a:ext cx="940422" cy="2160024"/>
           </a:xfrm>
           <a:prstGeom prst="straightConnector1">
             <a:avLst/>
@@ -5095,8 +5146,8 @@
         </p:nvCxnSpPr>
         <p:spPr bwMode="auto">
           <a:xfrm flipV="1">
-            <a:off x="3156668" y="1733385"/>
-            <a:ext cx="1025718" cy="1645919"/>
+            <a:off x="3190208" y="1733386"/>
+            <a:ext cx="940422" cy="1555724"/>
           </a:xfrm>
           <a:prstGeom prst="straightConnector1">
             <a:avLst/>
@@ -5126,8 +5177,8 @@
         </p:nvCxnSpPr>
         <p:spPr bwMode="auto">
           <a:xfrm flipV="1">
-            <a:off x="3156668" y="2329732"/>
-            <a:ext cx="1025718" cy="1049572"/>
+            <a:off x="3190208" y="2329732"/>
+            <a:ext cx="940422" cy="959378"/>
           </a:xfrm>
           <a:prstGeom prst="straightConnector1">
             <a:avLst/>
@@ -5157,8 +5208,8 @@
         </p:nvCxnSpPr>
         <p:spPr bwMode="auto">
           <a:xfrm flipV="1">
-            <a:off x="3156668" y="2918129"/>
-            <a:ext cx="1025718" cy="461175"/>
+            <a:off x="3190208" y="2918130"/>
+            <a:ext cx="940422" cy="370980"/>
           </a:xfrm>
           <a:prstGeom prst="straightConnector1">
             <a:avLst/>
@@ -5188,8 +5239,8 @@
         </p:nvCxnSpPr>
         <p:spPr bwMode="auto">
           <a:xfrm>
-            <a:off x="3156668" y="3379304"/>
-            <a:ext cx="1025718" cy="135174"/>
+            <a:off x="3190208" y="3289110"/>
+            <a:ext cx="940422" cy="225368"/>
           </a:xfrm>
           <a:prstGeom prst="straightConnector1">
             <a:avLst/>
@@ -5219,8 +5270,8 @@
         </p:nvCxnSpPr>
         <p:spPr bwMode="auto">
           <a:xfrm>
-            <a:off x="3156668" y="3379304"/>
-            <a:ext cx="1025718" cy="779228"/>
+            <a:off x="3190208" y="3289110"/>
+            <a:ext cx="940422" cy="869422"/>
           </a:xfrm>
           <a:prstGeom prst="straightConnector1">
             <a:avLst/>
@@ -5250,8 +5301,8 @@
         </p:nvCxnSpPr>
         <p:spPr bwMode="auto">
           <a:xfrm>
-            <a:off x="3156668" y="3379304"/>
-            <a:ext cx="1025718" cy="1335819"/>
+            <a:off x="3190208" y="3289110"/>
+            <a:ext cx="940422" cy="1426013"/>
           </a:xfrm>
           <a:prstGeom prst="straightConnector1">
             <a:avLst/>
@@ -5281,8 +5332,8 @@
         </p:nvCxnSpPr>
         <p:spPr bwMode="auto">
           <a:xfrm>
-            <a:off x="3156668" y="3379304"/>
-            <a:ext cx="1025718" cy="1979875"/>
+            <a:off x="3190208" y="3289110"/>
+            <a:ext cx="940422" cy="2070069"/>
           </a:xfrm>
           <a:prstGeom prst="straightConnector1">
             <a:avLst/>
@@ -5312,8 +5363,8 @@
         </p:nvCxnSpPr>
         <p:spPr bwMode="auto">
           <a:xfrm>
-            <a:off x="3156668" y="3379304"/>
-            <a:ext cx="1025718" cy="2623931"/>
+            <a:off x="3190208" y="3289110"/>
+            <a:ext cx="940422" cy="2714125"/>
           </a:xfrm>
           <a:prstGeom prst="straightConnector1">
             <a:avLst/>
@@ -5343,8 +5394,8 @@
         </p:nvCxnSpPr>
         <p:spPr bwMode="auto">
           <a:xfrm>
-            <a:off x="4962939" y="2329732"/>
-            <a:ext cx="1042076" cy="214685"/>
+            <a:off x="4983382" y="2329732"/>
+            <a:ext cx="849085" cy="57208"/>
           </a:xfrm>
           <a:prstGeom prst="straightConnector1">
             <a:avLst/>
@@ -5374,8 +5425,8 @@
         </p:nvCxnSpPr>
         <p:spPr bwMode="auto">
           <a:xfrm>
-            <a:off x="4962939" y="2329732"/>
-            <a:ext cx="1042076" cy="959378"/>
+            <a:off x="4983382" y="2329732"/>
+            <a:ext cx="849085" cy="811291"/>
           </a:xfrm>
           <a:prstGeom prst="straightConnector1">
             <a:avLst/>
@@ -5405,8 +5456,8 @@
         </p:nvCxnSpPr>
         <p:spPr bwMode="auto">
           <a:xfrm>
-            <a:off x="4962939" y="2329732"/>
-            <a:ext cx="1042076" cy="1634943"/>
+            <a:off x="4983382" y="2329732"/>
+            <a:ext cx="849085" cy="1565374"/>
           </a:xfrm>
           <a:prstGeom prst="straightConnector1">
             <a:avLst/>
@@ -5436,8 +5487,8 @@
         </p:nvCxnSpPr>
         <p:spPr bwMode="auto">
           <a:xfrm>
-            <a:off x="4962939" y="2329732"/>
-            <a:ext cx="1042076" cy="2440161"/>
+            <a:off x="4983382" y="2329732"/>
+            <a:ext cx="849085" cy="2301645"/>
           </a:xfrm>
           <a:prstGeom prst="straightConnector1">
             <a:avLst/>
@@ -5467,8 +5518,8 @@
         </p:nvCxnSpPr>
         <p:spPr bwMode="auto">
           <a:xfrm>
-            <a:off x="4962939" y="2329732"/>
-            <a:ext cx="1042076" cy="3170316"/>
+            <a:off x="4983382" y="2329732"/>
+            <a:ext cx="849085" cy="3073541"/>
           </a:xfrm>
           <a:prstGeom prst="straightConnector1">
             <a:avLst/>
@@ -5498,132 +5549,8 @@
         </p:nvCxnSpPr>
         <p:spPr bwMode="auto">
           <a:xfrm flipV="1">
-            <a:off x="4976587" y="2544417"/>
-            <a:ext cx="1028428" cy="407831"/>
-          </a:xfrm>
-          <a:prstGeom prst="straightConnector1">
-            <a:avLst/>
-          </a:prstGeom>
-          <a:solidFill>
-            <a:schemeClr val="accent1"/>
-          </a:solidFill>
-          <a:ln w="3175" cap="flat" cmpd="sng" algn="ctr">
-            <a:solidFill>
-              <a:schemeClr val="tx1">
-                <a:alpha val="35000"/>
-              </a:schemeClr>
-            </a:solidFill>
-            <a:prstDash val="solid"/>
-            <a:round/>
-            <a:headEnd type="none" w="med" len="med"/>
-            <a:tailEnd type="arrow"/>
-          </a:ln>
-          <a:effectLst/>
-        </p:spPr>
-      </p:cxnSp>
-      <p:cxnSp>
-        <p:nvCxnSpPr>
-          <p:cNvPr id="85" name="직선 화살표 연결선 84"/>
-          <p:cNvCxnSpPr/>
-          <p:nvPr/>
-        </p:nvCxnSpPr>
-        <p:spPr bwMode="auto">
-          <a:xfrm>
-            <a:off x="4976587" y="2952248"/>
-            <a:ext cx="1028428" cy="336862"/>
-          </a:xfrm>
-          <a:prstGeom prst="straightConnector1">
-            <a:avLst/>
-          </a:prstGeom>
-          <a:solidFill>
-            <a:schemeClr val="accent1"/>
-          </a:solidFill>
-          <a:ln w="3175" cap="flat" cmpd="sng" algn="ctr">
-            <a:solidFill>
-              <a:schemeClr val="tx1">
-                <a:alpha val="35000"/>
-              </a:schemeClr>
-            </a:solidFill>
-            <a:prstDash val="solid"/>
-            <a:round/>
-            <a:headEnd type="none" w="med" len="med"/>
-            <a:tailEnd type="arrow"/>
-          </a:ln>
-          <a:effectLst/>
-        </p:spPr>
-      </p:cxnSp>
-      <p:cxnSp>
-        <p:nvCxnSpPr>
-          <p:cNvPr id="88" name="직선 화살표 연결선 87"/>
-          <p:cNvCxnSpPr/>
-          <p:nvPr/>
-        </p:nvCxnSpPr>
-        <p:spPr bwMode="auto">
-          <a:xfrm>
-            <a:off x="4976587" y="2952248"/>
-            <a:ext cx="1028428" cy="1012427"/>
-          </a:xfrm>
-          <a:prstGeom prst="straightConnector1">
-            <a:avLst/>
-          </a:prstGeom>
-          <a:solidFill>
-            <a:schemeClr val="accent1"/>
-          </a:solidFill>
-          <a:ln w="3175" cap="flat" cmpd="sng" algn="ctr">
-            <a:solidFill>
-              <a:schemeClr val="tx1">
-                <a:alpha val="35000"/>
-              </a:schemeClr>
-            </a:solidFill>
-            <a:prstDash val="solid"/>
-            <a:round/>
-            <a:headEnd type="none" w="med" len="med"/>
-            <a:tailEnd type="arrow"/>
-          </a:ln>
-          <a:effectLst/>
-        </p:spPr>
-      </p:cxnSp>
-      <p:cxnSp>
-        <p:nvCxnSpPr>
-          <p:cNvPr id="91" name="직선 화살표 연결선 90"/>
-          <p:cNvCxnSpPr/>
-          <p:nvPr/>
-        </p:nvCxnSpPr>
-        <p:spPr bwMode="auto">
-          <a:xfrm>
-            <a:off x="4962939" y="2952248"/>
-            <a:ext cx="1042076" cy="1817645"/>
-          </a:xfrm>
-          <a:prstGeom prst="straightConnector1">
-            <a:avLst/>
-          </a:prstGeom>
-          <a:solidFill>
-            <a:schemeClr val="accent1"/>
-          </a:solidFill>
-          <a:ln w="3175" cap="flat" cmpd="sng" algn="ctr">
-            <a:solidFill>
-              <a:schemeClr val="tx1">
-                <a:alpha val="35000"/>
-              </a:schemeClr>
-            </a:solidFill>
-            <a:prstDash val="solid"/>
-            <a:round/>
-            <a:headEnd type="none" w="med" len="med"/>
-            <a:tailEnd type="arrow"/>
-          </a:ln>
-          <a:effectLst/>
-        </p:spPr>
-      </p:cxnSp>
-      <p:cxnSp>
-        <p:nvCxnSpPr>
-          <p:cNvPr id="95" name="직선 화살표 연결선 94"/>
-          <p:cNvCxnSpPr/>
-          <p:nvPr/>
-        </p:nvCxnSpPr>
-        <p:spPr bwMode="auto">
-          <a:xfrm>
-            <a:off x="4976587" y="2952248"/>
-            <a:ext cx="1028428" cy="2547800"/>
+            <a:off x="4983382" y="2386945"/>
+            <a:ext cx="849085" cy="486884"/>
           </a:xfrm>
           <a:prstGeom prst="straightConnector1">
             <a:avLst/>
@@ -5653,8 +5580,8 @@
         </p:nvCxnSpPr>
         <p:spPr bwMode="auto">
           <a:xfrm>
-            <a:off x="4962939" y="1733385"/>
-            <a:ext cx="1042076" cy="811032"/>
+            <a:off x="4983382" y="1733386"/>
+            <a:ext cx="849085" cy="653554"/>
           </a:xfrm>
           <a:prstGeom prst="straightConnector1">
             <a:avLst/>
@@ -5713,33 +5640,9 @@
           <a:chExt cx="0" cy="0"/>
         </a:xfrm>
       </p:grpSpPr>
-      <p:sp>
-        <p:nvSpPr>
-          <p:cNvPr id="2" name="바닥글 개체 틀 1"/>
-          <p:cNvSpPr>
-            <a:spLocks noGrp="1"/>
-          </p:cNvSpPr>
-          <p:nvPr>
-            <p:ph type="ftr" sz="quarter" idx="3"/>
-          </p:nvPr>
-        </p:nvSpPr>
-        <p:spPr/>
-        <p:txBody>
-          <a:bodyPr/>
-          <a:lstStyle/>
-          <a:p>
-            <a:pPr algn="r"/>
-            <a:r>
-              <a:rPr lang="ko-KR" altLang="en-US" smtClean="0"/>
-              <a:t>팀 명</a:t>
-            </a:r>
-            <a:endParaRPr lang="en-US" altLang="ko-KR" dirty="0"/>
-          </a:p>
-        </p:txBody>
-      </p:sp>
       <p:pic>
         <p:nvPicPr>
-          <p:cNvPr id="2050" name="Picture 2"/>
+          <p:cNvPr id="3" name="Picture 2"/>
           <p:cNvPicPr>
             <a:picLocks noChangeAspect="1" noChangeArrowheads="1"/>
           </p:cNvPicPr>
@@ -5760,8 +5663,8 @@
         </p:blipFill>
         <p:spPr bwMode="auto">
           <a:xfrm>
-            <a:off x="2210464" y="838862"/>
-            <a:ext cx="5136544" cy="5510253"/>
+            <a:off x="2253476" y="827750"/>
+            <a:ext cx="4650868" cy="5500673"/>
           </a:xfrm>
           <a:prstGeom prst="rect">
             <a:avLst/>
@@ -5791,6 +5694,30 @@
           </a:extLst>
         </p:spPr>
       </p:pic>
+      <p:sp>
+        <p:nvSpPr>
+          <p:cNvPr id="2" name="바닥글 개체 틀 1"/>
+          <p:cNvSpPr>
+            <a:spLocks noGrp="1"/>
+          </p:cNvSpPr>
+          <p:nvPr>
+            <p:ph type="ftr" sz="quarter" idx="3"/>
+          </p:nvPr>
+        </p:nvSpPr>
+        <p:spPr/>
+        <p:txBody>
+          <a:bodyPr/>
+          <a:lstStyle/>
+          <a:p>
+            <a:pPr algn="r"/>
+            <a:r>
+              <a:rPr lang="en-US" altLang="ko-KR" dirty="0"/>
+              <a:t>Pigeon</a:t>
+            </a:r>
+            <a:endParaRPr lang="en-US" altLang="ko-KR" dirty="0"/>
+          </a:p>
+        </p:txBody>
+      </p:sp>
       <p:cxnSp>
         <p:nvCxnSpPr>
           <p:cNvPr id="4" name="직선 화살표 연결선 3"/>
@@ -5799,8 +5726,8 @@
         </p:nvCxnSpPr>
         <p:spPr bwMode="auto">
           <a:xfrm flipV="1">
-            <a:off x="3212327" y="1129086"/>
-            <a:ext cx="970059" cy="2449001"/>
+            <a:off x="3159457" y="1216551"/>
+            <a:ext cx="962167" cy="2127150"/>
           </a:xfrm>
           <a:prstGeom prst="straightConnector1">
             <a:avLst/>
@@ -5830,8 +5757,8 @@
         </p:nvCxnSpPr>
         <p:spPr bwMode="auto">
           <a:xfrm flipV="1">
-            <a:off x="3212327" y="1876508"/>
-            <a:ext cx="970059" cy="1701579"/>
+            <a:off x="3159457" y="1781033"/>
+            <a:ext cx="962167" cy="1562668"/>
           </a:xfrm>
           <a:prstGeom prst="straightConnector1">
             <a:avLst/>
@@ -5861,8 +5788,8 @@
         </p:nvCxnSpPr>
         <p:spPr bwMode="auto">
           <a:xfrm flipV="1">
-            <a:off x="3212327" y="2552370"/>
-            <a:ext cx="970059" cy="1025717"/>
+            <a:off x="3159457" y="2340591"/>
+            <a:ext cx="962167" cy="1003110"/>
           </a:xfrm>
           <a:prstGeom prst="straightConnector1">
             <a:avLst/>
@@ -5892,8 +5819,8 @@
         </p:nvCxnSpPr>
         <p:spPr bwMode="auto">
           <a:xfrm flipV="1">
-            <a:off x="3212327" y="3156668"/>
-            <a:ext cx="970059" cy="421419"/>
+            <a:off x="3159457" y="2920621"/>
+            <a:ext cx="962167" cy="423080"/>
           </a:xfrm>
           <a:prstGeom prst="straightConnector1">
             <a:avLst/>
@@ -5923,8 +5850,8 @@
         </p:nvCxnSpPr>
         <p:spPr bwMode="auto">
           <a:xfrm>
-            <a:off x="3212327" y="3578087"/>
-            <a:ext cx="970059" cy="262393"/>
+            <a:off x="3159457" y="3343701"/>
+            <a:ext cx="962167" cy="232012"/>
           </a:xfrm>
           <a:prstGeom prst="straightConnector1">
             <a:avLst/>
@@ -5954,8 +5881,8 @@
         </p:nvCxnSpPr>
         <p:spPr bwMode="auto">
           <a:xfrm>
-            <a:off x="3212327" y="3578087"/>
-            <a:ext cx="970059" cy="962108"/>
+            <a:off x="3159457" y="3343701"/>
+            <a:ext cx="962167" cy="1112293"/>
           </a:xfrm>
           <a:prstGeom prst="straightConnector1">
             <a:avLst/>
@@ -5985,8 +5912,8 @@
         </p:nvCxnSpPr>
         <p:spPr bwMode="auto">
           <a:xfrm>
-            <a:off x="3212327" y="3578087"/>
-            <a:ext cx="970059" cy="1677725"/>
+            <a:off x="3159457" y="3343701"/>
+            <a:ext cx="962167" cy="1849272"/>
           </a:xfrm>
           <a:prstGeom prst="straightConnector1">
             <a:avLst/>
@@ -6016,8 +5943,8 @@
         </p:nvCxnSpPr>
         <p:spPr bwMode="auto">
           <a:xfrm>
-            <a:off x="3212327" y="3578087"/>
-            <a:ext cx="970059" cy="2393343"/>
+            <a:off x="3159457" y="3343701"/>
+            <a:ext cx="962167" cy="2627729"/>
           </a:xfrm>
           <a:prstGeom prst="straightConnector1">
             <a:avLst/>
@@ -6047,8 +5974,8 @@
         </p:nvCxnSpPr>
         <p:spPr bwMode="auto">
           <a:xfrm>
-            <a:off x="4970891" y="1216551"/>
-            <a:ext cx="1090854" cy="2289974"/>
+            <a:off x="5029200" y="1216551"/>
+            <a:ext cx="948519" cy="2065736"/>
           </a:xfrm>
           <a:prstGeom prst="straightConnector1">
             <a:avLst/>
@@ -6078,8 +6005,8 @@
         </p:nvCxnSpPr>
         <p:spPr bwMode="auto">
           <a:xfrm>
-            <a:off x="4954988" y="1876508"/>
-            <a:ext cx="1106757" cy="1630017"/>
+            <a:off x="5029200" y="1781033"/>
+            <a:ext cx="948519" cy="1501254"/>
           </a:xfrm>
           <a:prstGeom prst="straightConnector1">
             <a:avLst/>
@@ -6109,8 +6036,8 @@
         </p:nvCxnSpPr>
         <p:spPr bwMode="auto">
           <a:xfrm>
-            <a:off x="4970891" y="2552370"/>
-            <a:ext cx="1090854" cy="954155"/>
+            <a:off x="5029200" y="2340591"/>
+            <a:ext cx="948519" cy="941696"/>
           </a:xfrm>
           <a:prstGeom prst="straightConnector1">
             <a:avLst/>
@@ -6140,8 +6067,8 @@
         </p:nvCxnSpPr>
         <p:spPr bwMode="auto">
           <a:xfrm>
-            <a:off x="4970891" y="3220280"/>
-            <a:ext cx="1090854" cy="286245"/>
+            <a:off x="5029200" y="2920621"/>
+            <a:ext cx="948519" cy="361666"/>
           </a:xfrm>
           <a:prstGeom prst="straightConnector1">
             <a:avLst/>
@@ -6217,8 +6144,8 @@
           <a:p>
             <a:pPr algn="r"/>
             <a:r>
-              <a:rPr lang="ko-KR" altLang="en-US" smtClean="0"/>
-              <a:t>팀 명</a:t>
+              <a:rPr lang="en-US" altLang="ko-KR" dirty="0"/>
+              <a:t>Pigeon</a:t>
             </a:r>
             <a:endParaRPr lang="en-US" altLang="ko-KR" dirty="0"/>
           </a:p>
@@ -6260,11 +6187,7 @@
                       <a:pPr latinLnBrk="1"/>
                       <a:r>
                         <a:rPr lang="ko-KR" altLang="en-US" dirty="0" smtClean="0"/>
-                        <a:t>과제 </a:t>
-                      </a:r>
-                      <a:r>
-                        <a:rPr lang="ko-KR" altLang="en-US" dirty="0" smtClean="0"/>
-                        <a:t>등록 창</a:t>
+                        <a:t>과제 등록 창</a:t>
                       </a:r>
                       <a:r>
                         <a:rPr lang="en-US" altLang="ko-KR" dirty="0" smtClean="0"/>

</xml_diff>

<commit_message>
# 서류 # doc/3_ 설계서/Class Design_9_pigeon.pptx # doc/3_ 설계서/UI Design Template_9_pigeon.pptx # 완료
</commit_message>
<xml_diff>
--- a/doc/3_ 설계서/Class Design_9_pigeon.pptx
+++ b/doc/3_ 설계서/Class Design_9_pigeon.pptx
@@ -147,7 +147,7 @@
   </p:defaultTextStyle>
   <p:extLst>
     <p:ext uri="{EFAFB233-063F-42B5-8137-9DF3F51BA10A}">
-      <p15:sldGuideLst xmlns:p15="http://schemas.microsoft.com/office/powerpoint/2012/main" xmlns="">
+      <p15:sldGuideLst xmlns:p15="http://schemas.microsoft.com/office/powerpoint/2012/main">
         <p15:guide id="1" orient="horz">
           <p15:clr>
             <a:srgbClr val="A4A3A4"/>
@@ -166,7 +166,7 @@
       </p15:sldGuideLst>
     </p:ext>
     <p:ext uri="{2D200454-40CA-4A62-9FC3-DE9A4176ACB9}">
-      <p15:notesGuideLst xmlns:p15="http://schemas.microsoft.com/office/powerpoint/2012/main" xmlns="">
+      <p15:notesGuideLst xmlns:p15="http://schemas.microsoft.com/office/powerpoint/2012/main">
         <p15:guide id="1" orient="horz" pos="3126">
           <p15:clr>
             <a:srgbClr val="A4A3A4"/>
@@ -5603,6 +5603,37 @@
           <a:effectLst/>
         </p:spPr>
       </p:cxnSp>
+      <p:cxnSp>
+        <p:nvCxnSpPr>
+          <p:cNvPr id="20" name="직선 화살표 연결선 19"/>
+          <p:cNvCxnSpPr/>
+          <p:nvPr/>
+        </p:nvCxnSpPr>
+        <p:spPr bwMode="auto">
+          <a:xfrm flipV="1">
+            <a:off x="4983382" y="1657391"/>
+            <a:ext cx="849085" cy="75990"/>
+          </a:xfrm>
+          <a:prstGeom prst="straightConnector1">
+            <a:avLst/>
+          </a:prstGeom>
+          <a:solidFill>
+            <a:schemeClr val="accent1"/>
+          </a:solidFill>
+          <a:ln w="3175" cap="flat" cmpd="sng" algn="ctr">
+            <a:solidFill>
+              <a:schemeClr val="tx1">
+                <a:alpha val="35000"/>
+              </a:schemeClr>
+            </a:solidFill>
+            <a:prstDash val="solid"/>
+            <a:round/>
+            <a:headEnd type="none" w="med" len="med"/>
+            <a:tailEnd type="arrow"/>
+          </a:ln>
+          <a:effectLst/>
+        </p:spPr>
+      </p:cxnSp>
     </p:spTree>
     <p:extLst>
       <p:ext uri="{BB962C8B-B14F-4D97-AF65-F5344CB8AC3E}">
@@ -5714,7 +5745,6 @@
               <a:rPr lang="en-US" altLang="ko-KR" dirty="0"/>
               <a:t>Pigeon</a:t>
             </a:r>
-            <a:endParaRPr lang="en-US" altLang="ko-KR" dirty="0"/>
           </a:p>
         </p:txBody>
       </p:sp>
@@ -6147,7 +6177,6 @@
               <a:rPr lang="en-US" altLang="ko-KR" dirty="0"/>
               <a:t>Pigeon</a:t>
             </a:r>
-            <a:endParaRPr lang="en-US" altLang="ko-KR" dirty="0"/>
           </a:p>
         </p:txBody>
       </p:sp>

</xml_diff>